<commit_message>
Added Timeline, documentation and zuständigkeiten to the presentation
</commit_message>
<xml_diff>
--- a/Presentations/Milestone 1/Präsentation_Buddler_Joe.pptx
+++ b/Presentations/Milestone 1/Präsentation_Buddler_Joe.pptx
@@ -5,7 +5,7 @@
     <p:sldMasterId id="2147483648" r:id="rId1"/>
   </p:sldMasterIdLst>
   <p:notesMasterIdLst>
-    <p:notesMasterId r:id="rId11"/>
+    <p:notesMasterId r:id="rId12"/>
   </p:notesMasterIdLst>
   <p:sldIdLst>
     <p:sldId id="256" r:id="rId2"/>
@@ -16,7 +16,8 @@
     <p:sldId id="277" r:id="rId7"/>
     <p:sldId id="281" r:id="rId8"/>
     <p:sldId id="282" r:id="rId9"/>
-    <p:sldId id="276" r:id="rId10"/>
+    <p:sldId id="283" r:id="rId10"/>
+    <p:sldId id="276" r:id="rId11"/>
   </p:sldIdLst>
   <p:sldSz cx="9144000" cy="6858000" type="screen4x3"/>
   <p:notesSz cx="7099300" cy="10234613"/>
@@ -376,7 +377,7 @@
           <a:p>
             <a:fld id="{484FEB8E-57CB-43C0-BEF7-4F4116A5252C}" type="datetimeFigureOut">
               <a:rPr lang="de-CH" smtClean="0"/>
-              <a:t>28.02.19</a:t>
+              <a:t>02.03.19</a:t>
             </a:fld>
             <a:endParaRPr lang="de-CH"/>
           </a:p>
@@ -3468,7 +3469,11 @@
             </a:r>
             <a:r>
               <a:rPr lang="de-CH" sz="2800" dirty="0"/>
-              <a:t> Corp.</a:t>
+              <a:t> </a:t>
+            </a:r>
+            <a:r>
+              <a:rPr lang="de-CH" sz="2800" dirty="0" err="1"/>
+              <a:t>corp.</a:t>
             </a:r>
             <a:br>
               <a:rPr lang="de-CH" sz="2800" dirty="0"/>
@@ -3497,7 +3502,7 @@
         <p:spPr>
           <a:xfrm>
             <a:off x="971550" y="3212976"/>
-            <a:ext cx="6800850" cy="864096"/>
+            <a:ext cx="6800850" cy="1224136"/>
           </a:xfrm>
         </p:spPr>
         <p:txBody>
@@ -3553,10 +3558,105 @@
           </a:p>
         </p:txBody>
       </p:sp>
+      <p:pic>
+        <p:nvPicPr>
+          <p:cNvPr id="4" name="Content Placeholder 9" descr="A close up of a sign&#10;&#10;Description automatically generated">
+            <a:extLst>
+              <a:ext uri="{FF2B5EF4-FFF2-40B4-BE49-F238E27FC236}">
+                <a16:creationId xmlns:a16="http://schemas.microsoft.com/office/drawing/2014/main" id="{E0B7B686-2FA0-674A-9AB6-4B6B1C4C7CFB}"/>
+              </a:ext>
+            </a:extLst>
+          </p:cNvPr>
+          <p:cNvPicPr>
+            <a:picLocks noChangeAspect="1"/>
+          </p:cNvPicPr>
+          <p:nvPr/>
+        </p:nvPicPr>
+        <p:blipFill>
+          <a:blip r:embed="rId2">
+            <a:extLst>
+              <a:ext uri="{28A0092B-C50C-407E-A947-70E740481C1C}">
+                <a14:useLocalDpi xmlns:a14="http://schemas.microsoft.com/office/drawing/2010/main" val="0"/>
+              </a:ext>
+            </a:extLst>
+          </a:blip>
+          <a:stretch>
+            <a:fillRect/>
+          </a:stretch>
+        </p:blipFill>
+        <p:spPr>
+          <a:xfrm>
+            <a:off x="7308304" y="5229200"/>
+            <a:ext cx="1684164" cy="1510134"/>
+          </a:xfrm>
+          <a:prstGeom prst="rect">
+            <a:avLst/>
+          </a:prstGeom>
+        </p:spPr>
+      </p:pic>
     </p:spTree>
     <p:extLst>
       <p:ext uri="{BB962C8B-B14F-4D97-AF65-F5344CB8AC3E}">
         <p14:creationId xmlns:p14="http://schemas.microsoft.com/office/powerpoint/2010/main" val="964541059"/>
+      </p:ext>
+    </p:extLst>
+  </p:cSld>
+  <p:clrMapOvr>
+    <a:masterClrMapping/>
+  </p:clrMapOvr>
+</p:sld>
+</file>
+
+<file path=ppt/slides/slide10.xml><?xml version="1.0" encoding="utf-8"?>
+<p:sld xmlns:a="http://schemas.openxmlformats.org/drawingml/2006/main" xmlns:r="http://schemas.openxmlformats.org/officeDocument/2006/relationships" xmlns:p="http://schemas.openxmlformats.org/presentationml/2006/main">
+  <p:cSld>
+    <p:spTree>
+      <p:nvGrpSpPr>
+        <p:cNvPr id="1" name=""/>
+        <p:cNvGrpSpPr/>
+        <p:nvPr/>
+      </p:nvGrpSpPr>
+      <p:grpSpPr>
+        <a:xfrm>
+          <a:off x="0" y="0"/>
+          <a:ext cx="0" cy="0"/>
+          <a:chOff x="0" y="0"/>
+          <a:chExt cx="0" cy="0"/>
+        </a:xfrm>
+      </p:grpSpPr>
+      <p:sp>
+        <p:nvSpPr>
+          <p:cNvPr id="2" name="Titel 1"/>
+          <p:cNvSpPr>
+            <a:spLocks noGrp="1"/>
+          </p:cNvSpPr>
+          <p:nvPr>
+            <p:ph type="ctrTitle"/>
+          </p:nvPr>
+        </p:nvSpPr>
+        <p:spPr/>
+        <p:txBody>
+          <a:bodyPr/>
+          <a:lstStyle/>
+          <a:p>
+            <a:r>
+              <a:rPr lang="de-CH" dirty="0"/>
+              <a:t>Vielen Dank</a:t>
+            </a:r>
+            <a:br>
+              <a:rPr lang="de-CH" dirty="0"/>
+            </a:br>
+            <a:r>
+              <a:rPr lang="de-CH" b="0" dirty="0"/>
+              <a:t>für Ihre Aufmerksamkeit.</a:t>
+            </a:r>
+          </a:p>
+        </p:txBody>
+      </p:sp>
+    </p:spTree>
+    <p:extLst>
+      <p:ext uri="{BB962C8B-B14F-4D97-AF65-F5344CB8AC3E}">
+        <p14:creationId xmlns:p14="http://schemas.microsoft.com/office/powerpoint/2010/main" val="69276885"/>
       </p:ext>
     </p:extLst>
   </p:cSld>
@@ -4552,28 +4652,6 @@
       </p:sp>
       <p:sp>
         <p:nvSpPr>
-          <p:cNvPr id="3" name="Inhaltsplatzhalter 2"/>
-          <p:cNvSpPr>
-            <a:spLocks noGrp="1"/>
-          </p:cNvSpPr>
-          <p:nvPr>
-            <p:ph idx="1"/>
-          </p:nvPr>
-        </p:nvSpPr>
-        <p:spPr/>
-        <p:txBody>
-          <a:bodyPr/>
-          <a:lstStyle/>
-          <a:p>
-            <a:r>
-              <a:rPr lang="de-CH" sz="2400" dirty="0"/>
-              <a:t>TODO:</a:t>
-            </a:r>
-          </a:p>
-        </p:txBody>
-      </p:sp>
-      <p:sp>
-        <p:nvSpPr>
           <p:cNvPr id="4" name="Datumsplatzhalter 3"/>
           <p:cNvSpPr>
             <a:spLocks noGrp="1"/>
@@ -4663,6 +4741,156 @@
           </a:p>
         </p:txBody>
       </p:sp>
+      <p:pic>
+        <p:nvPicPr>
+          <p:cNvPr id="7" name="Content Placeholder 5" descr="Milestone 1">
+            <a:extLst>
+              <a:ext uri="{FF2B5EF4-FFF2-40B4-BE49-F238E27FC236}">
+                <a16:creationId xmlns:a16="http://schemas.microsoft.com/office/drawing/2014/main" id="{195E63FF-288F-B242-8560-4DA24FFFF6D0}"/>
+              </a:ext>
+            </a:extLst>
+          </p:cNvPr>
+          <p:cNvPicPr>
+            <a:picLocks noChangeAspect="1"/>
+          </p:cNvPicPr>
+          <p:nvPr/>
+        </p:nvPicPr>
+        <p:blipFill>
+          <a:blip r:embed="rId2"/>
+          <a:stretch>
+            <a:fillRect/>
+          </a:stretch>
+        </p:blipFill>
+        <p:spPr>
+          <a:xfrm>
+            <a:off x="431900" y="2238720"/>
+            <a:ext cx="8280200" cy="3277057"/>
+          </a:xfrm>
+          <a:prstGeom prst="rect">
+            <a:avLst/>
+          </a:prstGeom>
+        </p:spPr>
+      </p:pic>
+      <p:pic>
+        <p:nvPicPr>
+          <p:cNvPr id="8" name="Picture 7">
+            <a:extLst>
+              <a:ext uri="{FF2B5EF4-FFF2-40B4-BE49-F238E27FC236}">
+                <a16:creationId xmlns:a16="http://schemas.microsoft.com/office/drawing/2014/main" id="{1D19D802-7046-EB4E-BB48-7741B23A4464}"/>
+              </a:ext>
+            </a:extLst>
+          </p:cNvPr>
+          <p:cNvPicPr>
+            <a:picLocks noChangeAspect="1"/>
+          </p:cNvPicPr>
+          <p:nvPr/>
+        </p:nvPicPr>
+        <p:blipFill>
+          <a:blip r:embed="rId3"/>
+          <a:stretch>
+            <a:fillRect/>
+          </a:stretch>
+        </p:blipFill>
+        <p:spPr>
+          <a:xfrm>
+            <a:off x="459184" y="2625575"/>
+            <a:ext cx="8261055" cy="2503349"/>
+          </a:xfrm>
+          <a:prstGeom prst="rect">
+            <a:avLst/>
+          </a:prstGeom>
+        </p:spPr>
+      </p:pic>
+      <p:pic>
+        <p:nvPicPr>
+          <p:cNvPr id="9" name="Picture 8">
+            <a:extLst>
+              <a:ext uri="{FF2B5EF4-FFF2-40B4-BE49-F238E27FC236}">
+                <a16:creationId xmlns:a16="http://schemas.microsoft.com/office/drawing/2014/main" id="{10B3D0A2-7700-B94D-84F4-699B737D0A8C}"/>
+              </a:ext>
+            </a:extLst>
+          </p:cNvPr>
+          <p:cNvPicPr>
+            <a:picLocks noChangeAspect="1"/>
+          </p:cNvPicPr>
+          <p:nvPr/>
+        </p:nvPicPr>
+        <p:blipFill>
+          <a:blip r:embed="rId4"/>
+          <a:stretch>
+            <a:fillRect/>
+          </a:stretch>
+        </p:blipFill>
+        <p:spPr>
+          <a:xfrm>
+            <a:off x="441472" y="2019828"/>
+            <a:ext cx="8296478" cy="3714840"/>
+          </a:xfrm>
+          <a:prstGeom prst="rect">
+            <a:avLst/>
+          </a:prstGeom>
+        </p:spPr>
+      </p:pic>
+      <p:pic>
+        <p:nvPicPr>
+          <p:cNvPr id="10" name="Picture 9">
+            <a:extLst>
+              <a:ext uri="{FF2B5EF4-FFF2-40B4-BE49-F238E27FC236}">
+                <a16:creationId xmlns:a16="http://schemas.microsoft.com/office/drawing/2014/main" id="{F5042F26-5AB8-DD42-9A36-2632FEF62938}"/>
+              </a:ext>
+            </a:extLst>
+          </p:cNvPr>
+          <p:cNvPicPr>
+            <a:picLocks noChangeAspect="1"/>
+          </p:cNvPicPr>
+          <p:nvPr/>
+        </p:nvPicPr>
+        <p:blipFill>
+          <a:blip r:embed="rId5"/>
+          <a:stretch>
+            <a:fillRect/>
+          </a:stretch>
+        </p:blipFill>
+        <p:spPr>
+          <a:xfrm>
+            <a:off x="446330" y="3340695"/>
+            <a:ext cx="8256198" cy="1073105"/>
+          </a:xfrm>
+          <a:prstGeom prst="rect">
+            <a:avLst/>
+          </a:prstGeom>
+        </p:spPr>
+      </p:pic>
+      <p:pic>
+        <p:nvPicPr>
+          <p:cNvPr id="11" name="Picture 10">
+            <a:extLst>
+              <a:ext uri="{FF2B5EF4-FFF2-40B4-BE49-F238E27FC236}">
+                <a16:creationId xmlns:a16="http://schemas.microsoft.com/office/drawing/2014/main" id="{CABC7470-AA28-2540-949E-AF58C87160F2}"/>
+              </a:ext>
+            </a:extLst>
+          </p:cNvPr>
+          <p:cNvPicPr>
+            <a:picLocks noChangeAspect="1"/>
+          </p:cNvPicPr>
+          <p:nvPr/>
+        </p:nvPicPr>
+        <p:blipFill>
+          <a:blip r:embed="rId6"/>
+          <a:stretch>
+            <a:fillRect/>
+          </a:stretch>
+        </p:blipFill>
+        <p:spPr>
+          <a:xfrm>
+            <a:off x="459965" y="2612523"/>
+            <a:ext cx="8247422" cy="2884068"/>
+          </a:xfrm>
+          <a:prstGeom prst="rect">
+            <a:avLst/>
+          </a:prstGeom>
+        </p:spPr>
+      </p:pic>
     </p:spTree>
     <p:extLst>
       <p:ext uri="{BB962C8B-B14F-4D97-AF65-F5344CB8AC3E}">
@@ -4673,6 +4901,351 @@
   <p:clrMapOvr>
     <a:masterClrMapping/>
   </p:clrMapOvr>
+  <p:timing>
+    <p:tnLst>
+      <p:par>
+        <p:cTn id="1" dur="indefinite" restart="never" nodeType="tmRoot">
+          <p:childTnLst>
+            <p:seq concurrent="1" nextAc="seek">
+              <p:cTn id="2" dur="indefinite" nodeType="mainSeq">
+                <p:childTnLst>
+                  <p:par>
+                    <p:cTn id="3" fill="hold">
+                      <p:stCondLst>
+                        <p:cond delay="indefinite"/>
+                      </p:stCondLst>
+                      <p:childTnLst>
+                        <p:par>
+                          <p:cTn id="4" fill="hold">
+                            <p:stCondLst>
+                              <p:cond delay="0"/>
+                            </p:stCondLst>
+                            <p:childTnLst>
+                              <p:par>
+                                <p:cTn id="5" presetID="1" presetClass="exit" presetSubtype="0" fill="hold" nodeType="clickEffect">
+                                  <p:stCondLst>
+                                    <p:cond delay="0"/>
+                                  </p:stCondLst>
+                                  <p:childTnLst>
+                                    <p:set>
+                                      <p:cBhvr>
+                                        <p:cTn id="6" dur="1" fill="hold">
+                                          <p:stCondLst>
+                                            <p:cond delay="0"/>
+                                          </p:stCondLst>
+                                        </p:cTn>
+                                        <p:tgtEl>
+                                          <p:spTgt spid="7"/>
+                                        </p:tgtEl>
+                                        <p:attrNameLst>
+                                          <p:attrName>style.visibility</p:attrName>
+                                        </p:attrNameLst>
+                                      </p:cBhvr>
+                                      <p:to>
+                                        <p:strVal val="hidden"/>
+                                      </p:to>
+                                    </p:set>
+                                  </p:childTnLst>
+                                </p:cTn>
+                              </p:par>
+                            </p:childTnLst>
+                          </p:cTn>
+                        </p:par>
+                      </p:childTnLst>
+                    </p:cTn>
+                  </p:par>
+                  <p:par>
+                    <p:cTn id="7" fill="hold">
+                      <p:stCondLst>
+                        <p:cond delay="indefinite"/>
+                      </p:stCondLst>
+                      <p:childTnLst>
+                        <p:par>
+                          <p:cTn id="8" fill="hold">
+                            <p:stCondLst>
+                              <p:cond delay="0"/>
+                            </p:stCondLst>
+                            <p:childTnLst>
+                              <p:par>
+                                <p:cTn id="9" presetID="1" presetClass="entr" presetSubtype="0" fill="hold" nodeType="clickEffect">
+                                  <p:stCondLst>
+                                    <p:cond delay="0"/>
+                                  </p:stCondLst>
+                                  <p:childTnLst>
+                                    <p:set>
+                                      <p:cBhvr>
+                                        <p:cTn id="10" dur="1" fill="hold">
+                                          <p:stCondLst>
+                                            <p:cond delay="0"/>
+                                          </p:stCondLst>
+                                        </p:cTn>
+                                        <p:tgtEl>
+                                          <p:spTgt spid="8"/>
+                                        </p:tgtEl>
+                                        <p:attrNameLst>
+                                          <p:attrName>style.visibility</p:attrName>
+                                        </p:attrNameLst>
+                                      </p:cBhvr>
+                                      <p:to>
+                                        <p:strVal val="visible"/>
+                                      </p:to>
+                                    </p:set>
+                                  </p:childTnLst>
+                                </p:cTn>
+                              </p:par>
+                            </p:childTnLst>
+                          </p:cTn>
+                        </p:par>
+                      </p:childTnLst>
+                    </p:cTn>
+                  </p:par>
+                  <p:par>
+                    <p:cTn id="11" fill="hold">
+                      <p:stCondLst>
+                        <p:cond delay="indefinite"/>
+                      </p:stCondLst>
+                      <p:childTnLst>
+                        <p:par>
+                          <p:cTn id="12" fill="hold">
+                            <p:stCondLst>
+                              <p:cond delay="0"/>
+                            </p:stCondLst>
+                            <p:childTnLst>
+                              <p:par>
+                                <p:cTn id="13" presetID="1" presetClass="exit" presetSubtype="0" fill="hold" nodeType="clickEffect">
+                                  <p:stCondLst>
+                                    <p:cond delay="0"/>
+                                  </p:stCondLst>
+                                  <p:childTnLst>
+                                    <p:set>
+                                      <p:cBhvr>
+                                        <p:cTn id="14" dur="1" fill="hold">
+                                          <p:stCondLst>
+                                            <p:cond delay="0"/>
+                                          </p:stCondLst>
+                                        </p:cTn>
+                                        <p:tgtEl>
+                                          <p:spTgt spid="8"/>
+                                        </p:tgtEl>
+                                        <p:attrNameLst>
+                                          <p:attrName>style.visibility</p:attrName>
+                                        </p:attrNameLst>
+                                      </p:cBhvr>
+                                      <p:to>
+                                        <p:strVal val="hidden"/>
+                                      </p:to>
+                                    </p:set>
+                                  </p:childTnLst>
+                                </p:cTn>
+                              </p:par>
+                            </p:childTnLst>
+                          </p:cTn>
+                        </p:par>
+                      </p:childTnLst>
+                    </p:cTn>
+                  </p:par>
+                  <p:par>
+                    <p:cTn id="15" fill="hold">
+                      <p:stCondLst>
+                        <p:cond delay="indefinite"/>
+                      </p:stCondLst>
+                      <p:childTnLst>
+                        <p:par>
+                          <p:cTn id="16" fill="hold">
+                            <p:stCondLst>
+                              <p:cond delay="0"/>
+                            </p:stCondLst>
+                            <p:childTnLst>
+                              <p:par>
+                                <p:cTn id="17" presetID="1" presetClass="entr" presetSubtype="0" fill="hold" nodeType="clickEffect">
+                                  <p:stCondLst>
+                                    <p:cond delay="0"/>
+                                  </p:stCondLst>
+                                  <p:childTnLst>
+                                    <p:set>
+                                      <p:cBhvr>
+                                        <p:cTn id="18" dur="1" fill="hold">
+                                          <p:stCondLst>
+                                            <p:cond delay="0"/>
+                                          </p:stCondLst>
+                                        </p:cTn>
+                                        <p:tgtEl>
+                                          <p:spTgt spid="9"/>
+                                        </p:tgtEl>
+                                        <p:attrNameLst>
+                                          <p:attrName>style.visibility</p:attrName>
+                                        </p:attrNameLst>
+                                      </p:cBhvr>
+                                      <p:to>
+                                        <p:strVal val="visible"/>
+                                      </p:to>
+                                    </p:set>
+                                  </p:childTnLst>
+                                </p:cTn>
+                              </p:par>
+                            </p:childTnLst>
+                          </p:cTn>
+                        </p:par>
+                      </p:childTnLst>
+                    </p:cTn>
+                  </p:par>
+                  <p:par>
+                    <p:cTn id="19" fill="hold">
+                      <p:stCondLst>
+                        <p:cond delay="indefinite"/>
+                      </p:stCondLst>
+                      <p:childTnLst>
+                        <p:par>
+                          <p:cTn id="20" fill="hold">
+                            <p:stCondLst>
+                              <p:cond delay="0"/>
+                            </p:stCondLst>
+                            <p:childTnLst>
+                              <p:par>
+                                <p:cTn id="21" presetID="1" presetClass="exit" presetSubtype="0" fill="hold" nodeType="clickEffect">
+                                  <p:stCondLst>
+                                    <p:cond delay="0"/>
+                                  </p:stCondLst>
+                                  <p:childTnLst>
+                                    <p:set>
+                                      <p:cBhvr>
+                                        <p:cTn id="22" dur="1" fill="hold">
+                                          <p:stCondLst>
+                                            <p:cond delay="0"/>
+                                          </p:stCondLst>
+                                        </p:cTn>
+                                        <p:tgtEl>
+                                          <p:spTgt spid="9"/>
+                                        </p:tgtEl>
+                                        <p:attrNameLst>
+                                          <p:attrName>style.visibility</p:attrName>
+                                        </p:attrNameLst>
+                                      </p:cBhvr>
+                                      <p:to>
+                                        <p:strVal val="hidden"/>
+                                      </p:to>
+                                    </p:set>
+                                  </p:childTnLst>
+                                </p:cTn>
+                              </p:par>
+                            </p:childTnLst>
+                          </p:cTn>
+                        </p:par>
+                      </p:childTnLst>
+                    </p:cTn>
+                  </p:par>
+                  <p:par>
+                    <p:cTn id="23" fill="hold">
+                      <p:stCondLst>
+                        <p:cond delay="indefinite"/>
+                      </p:stCondLst>
+                      <p:childTnLst>
+                        <p:par>
+                          <p:cTn id="24" fill="hold">
+                            <p:stCondLst>
+                              <p:cond delay="0"/>
+                            </p:stCondLst>
+                            <p:childTnLst>
+                              <p:par>
+                                <p:cTn id="25" presetID="1" presetClass="entr" presetSubtype="0" fill="hold" nodeType="clickEffect">
+                                  <p:stCondLst>
+                                    <p:cond delay="0"/>
+                                  </p:stCondLst>
+                                  <p:childTnLst>
+                                    <p:set>
+                                      <p:cBhvr>
+                                        <p:cTn id="26" dur="1" fill="hold">
+                                          <p:stCondLst>
+                                            <p:cond delay="0"/>
+                                          </p:stCondLst>
+                                        </p:cTn>
+                                        <p:tgtEl>
+                                          <p:spTgt spid="10"/>
+                                        </p:tgtEl>
+                                        <p:attrNameLst>
+                                          <p:attrName>style.visibility</p:attrName>
+                                        </p:attrNameLst>
+                                      </p:cBhvr>
+                                      <p:to>
+                                        <p:strVal val="visible"/>
+                                      </p:to>
+                                    </p:set>
+                                  </p:childTnLst>
+                                </p:cTn>
+                              </p:par>
+                            </p:childTnLst>
+                          </p:cTn>
+                        </p:par>
+                      </p:childTnLst>
+                    </p:cTn>
+                  </p:par>
+                  <p:par>
+                    <p:cTn id="27" fill="hold">
+                      <p:stCondLst>
+                        <p:cond delay="indefinite"/>
+                      </p:stCondLst>
+                      <p:childTnLst>
+                        <p:par>
+                          <p:cTn id="28" fill="hold">
+                            <p:stCondLst>
+                              <p:cond delay="0"/>
+                            </p:stCondLst>
+                            <p:childTnLst>
+                              <p:par>
+                                <p:cTn id="29" presetID="1" presetClass="exit" presetSubtype="0" fill="hold" nodeType="clickEffect">
+                                  <p:stCondLst>
+                                    <p:cond delay="0"/>
+                                  </p:stCondLst>
+                                  <p:childTnLst>
+                                    <p:set>
+                                      <p:cBhvr>
+                                        <p:cTn id="30" dur="1" fill="hold">
+                                          <p:stCondLst>
+                                            <p:cond delay="0"/>
+                                          </p:stCondLst>
+                                        </p:cTn>
+                                        <p:tgtEl>
+                                          <p:spTgt spid="10"/>
+                                        </p:tgtEl>
+                                        <p:attrNameLst>
+                                          <p:attrName>style.visibility</p:attrName>
+                                        </p:attrNameLst>
+                                      </p:cBhvr>
+                                      <p:to>
+                                        <p:strVal val="hidden"/>
+                                      </p:to>
+                                    </p:set>
+                                  </p:childTnLst>
+                                </p:cTn>
+                              </p:par>
+                            </p:childTnLst>
+                          </p:cTn>
+                        </p:par>
+                      </p:childTnLst>
+                    </p:cTn>
+                  </p:par>
+                </p:childTnLst>
+              </p:cTn>
+              <p:prevCondLst>
+                <p:cond evt="onPrev" delay="0">
+                  <p:tgtEl>
+                    <p:sldTgt/>
+                  </p:tgtEl>
+                </p:cond>
+              </p:prevCondLst>
+              <p:nextCondLst>
+                <p:cond evt="onNext" delay="0">
+                  <p:tgtEl>
+                    <p:sldTgt/>
+                  </p:tgtEl>
+                </p:cond>
+              </p:nextCondLst>
+            </p:seq>
+          </p:childTnLst>
+        </p:cTn>
+      </p:par>
+    </p:tnLst>
+  </p:timing>
 </p:sld>
 </file>
 
@@ -4713,7 +5286,7 @@
             </a:br>
             <a:r>
               <a:rPr lang="de-CH" sz="3600" dirty="0"/>
-              <a:t>Dokumentation / Prozess</a:t>
+              <a:t>Zuständigkeiten</a:t>
             </a:r>
           </a:p>
         </p:txBody>
@@ -4733,9 +5306,121 @@
           <a:bodyPr/>
           <a:lstStyle/>
           <a:p>
+            <a:pPr>
+              <a:lnSpc>
+                <a:spcPct val="100000"/>
+              </a:lnSpc>
+            </a:pPr>
             <a:r>
               <a:rPr lang="de-CH" sz="2400" dirty="0"/>
-              <a:t>TODO:</a:t>
+              <a:t>-Matthias:</a:t>
+            </a:r>
+          </a:p>
+          <a:p>
+            <a:pPr>
+              <a:lnSpc>
+                <a:spcPct val="100000"/>
+              </a:lnSpc>
+            </a:pPr>
+            <a:r>
+              <a:rPr lang="de-CH" sz="2400" dirty="0"/>
+              <a:t>	Engine, Game Logik</a:t>
+            </a:r>
+          </a:p>
+          <a:p>
+            <a:pPr>
+              <a:lnSpc>
+                <a:spcPct val="100000"/>
+              </a:lnSpc>
+            </a:pPr>
+            <a:r>
+              <a:rPr lang="de-CH" sz="2400" dirty="0"/>
+              <a:t>-Moritz:</a:t>
+            </a:r>
+          </a:p>
+          <a:p>
+            <a:pPr>
+              <a:lnSpc>
+                <a:spcPct val="100000"/>
+              </a:lnSpc>
+            </a:pPr>
+            <a:r>
+              <a:rPr lang="de-CH" sz="2400" dirty="0"/>
+              <a:t>	Client, Grafik</a:t>
+            </a:r>
+          </a:p>
+          <a:p>
+            <a:pPr>
+              <a:lnSpc>
+                <a:spcPct val="100000"/>
+              </a:lnSpc>
+            </a:pPr>
+            <a:r>
+              <a:rPr lang="de-CH" sz="2400" dirty="0"/>
+              <a:t>-Sanja:</a:t>
+            </a:r>
+          </a:p>
+          <a:p>
+            <a:pPr>
+              <a:lnSpc>
+                <a:spcPct val="100000"/>
+              </a:lnSpc>
+            </a:pPr>
+            <a:r>
+              <a:rPr lang="de-CH" sz="2400" dirty="0"/>
+              <a:t>	Server, QA</a:t>
+            </a:r>
+          </a:p>
+          <a:p>
+            <a:pPr>
+              <a:lnSpc>
+                <a:spcPct val="100000"/>
+              </a:lnSpc>
+            </a:pPr>
+            <a:r>
+              <a:rPr lang="de-CH" sz="2400" dirty="0"/>
+              <a:t>-Sebastian:</a:t>
+            </a:r>
+          </a:p>
+          <a:p>
+            <a:pPr>
+              <a:lnSpc>
+                <a:spcPct val="100000"/>
+              </a:lnSpc>
+            </a:pPr>
+            <a:r>
+              <a:rPr lang="de-CH" sz="2400" dirty="0"/>
+              <a:t>	Grafik, Game Logik</a:t>
+            </a:r>
+          </a:p>
+          <a:p>
+            <a:pPr>
+              <a:lnSpc>
+                <a:spcPct val="100000"/>
+              </a:lnSpc>
+            </a:pPr>
+            <a:r>
+              <a:rPr lang="de-CH" sz="2400" dirty="0"/>
+              <a:t>-Viktor:</a:t>
+            </a:r>
+          </a:p>
+          <a:p>
+            <a:pPr>
+              <a:lnSpc>
+                <a:spcPct val="100000"/>
+              </a:lnSpc>
+            </a:pPr>
+            <a:r>
+              <a:rPr lang="de-CH" sz="2400" dirty="0"/>
+              <a:t>	Client/Server Kommunikation, </a:t>
+            </a:r>
+            <a:r>
+              <a:rPr lang="de-CH" sz="2400" dirty="0" err="1"/>
+              <a:t>Testing</a:t>
+            </a:r>
+            <a:r>
+              <a:rPr lang="de-CH" sz="2400" dirty="0"/>
+              <a:t>, Server</a:t>
             </a:r>
           </a:p>
         </p:txBody>
@@ -4868,7 +5553,7 @@
             <a:spLocks noGrp="1"/>
           </p:cNvSpPr>
           <p:nvPr>
-            <p:ph type="ctrTitle"/>
+            <p:ph type="title"/>
           </p:nvPr>
         </p:nvSpPr>
         <p:spPr/>
@@ -4876,16 +5561,284 @@
           <a:bodyPr/>
           <a:lstStyle/>
           <a:p>
+            <a:br>
+              <a:rPr lang="de-CH" sz="3600" dirty="0"/>
+            </a:br>
+            <a:r>
+              <a:rPr lang="de-CH" sz="3600" dirty="0"/>
+              <a:t>Dokumentation / Prozess</a:t>
+            </a:r>
+          </a:p>
+        </p:txBody>
+      </p:sp>
+      <p:sp>
+        <p:nvSpPr>
+          <p:cNvPr id="4" name="Datumsplatzhalter 3"/>
+          <p:cNvSpPr>
+            <a:spLocks noGrp="1"/>
+          </p:cNvSpPr>
+          <p:nvPr>
+            <p:ph type="dt" sz="half" idx="10"/>
+          </p:nvPr>
+        </p:nvSpPr>
+        <p:spPr>
+          <a:xfrm>
+            <a:off x="431800" y="6524626"/>
+            <a:ext cx="3204096" cy="180000"/>
+          </a:xfrm>
+        </p:spPr>
+        <p:txBody>
+          <a:bodyPr/>
+          <a:lstStyle/>
+          <a:p>
             <a:r>
               <a:rPr lang="de-CH" dirty="0"/>
-              <a:t>Vielen Dank</a:t>
-            </a:r>
-            <a:br>
+              <a:t>Meilenstein 1, </a:t>
+            </a:r>
+            <a:r>
+              <a:rPr lang="de-CH" dirty="0" err="1"/>
+              <a:t>Joe’s</a:t>
+            </a:r>
+            <a:r>
               <a:rPr lang="de-CH" dirty="0"/>
-            </a:br>
-            <a:r>
-              <a:rPr lang="de-CH" b="0" dirty="0"/>
-              <a:t>für Ihre Aufmerksamkeit.</a:t>
+              <a:t> </a:t>
+            </a:r>
+            <a:r>
+              <a:rPr lang="de-CH" dirty="0" err="1"/>
+              <a:t>Buddler</a:t>
+            </a:r>
+            <a:r>
+              <a:rPr lang="de-CH" dirty="0"/>
+              <a:t> Corp., Feb 2019  </a:t>
+            </a:r>
+          </a:p>
+        </p:txBody>
+      </p:sp>
+      <p:sp>
+        <p:nvSpPr>
+          <p:cNvPr id="5" name="Fußzeilenplatzhalter 4"/>
+          <p:cNvSpPr>
+            <a:spLocks noGrp="1"/>
+          </p:cNvSpPr>
+          <p:nvPr>
+            <p:ph type="ftr" sz="quarter" idx="11"/>
+          </p:nvPr>
+        </p:nvSpPr>
+        <p:spPr/>
+        <p:txBody>
+          <a:bodyPr/>
+          <a:lstStyle/>
+          <a:p>
+            <a:pPr algn="r"/>
+            <a:r>
+              <a:rPr lang="de-CH"/>
+              <a:t>Universität Basel</a:t>
+            </a:r>
+            <a:endParaRPr lang="de-CH" dirty="0"/>
+          </a:p>
+        </p:txBody>
+      </p:sp>
+      <p:sp>
+        <p:nvSpPr>
+          <p:cNvPr id="6" name="Foliennummernplatzhalter 5"/>
+          <p:cNvSpPr>
+            <a:spLocks noGrp="1"/>
+          </p:cNvSpPr>
+          <p:nvPr>
+            <p:ph type="sldNum" sz="quarter" idx="12"/>
+          </p:nvPr>
+        </p:nvSpPr>
+        <p:spPr/>
+        <p:txBody>
+          <a:bodyPr/>
+          <a:lstStyle/>
+          <a:p>
+            <a:fld id="{B3811826-9277-4232-A2B5-17D05DFC7392}" type="slidenum">
+              <a:rPr lang="de-CH" smtClean="0"/>
+              <a:pPr/>
+              <a:t>9</a:t>
+            </a:fld>
+            <a:endParaRPr lang="de-CH" dirty="0"/>
+          </a:p>
+        </p:txBody>
+      </p:sp>
+      <p:sp>
+        <p:nvSpPr>
+          <p:cNvPr id="11" name="Content Placeholder 10">
+            <a:extLst>
+              <a:ext uri="{FF2B5EF4-FFF2-40B4-BE49-F238E27FC236}">
+                <a16:creationId xmlns:a16="http://schemas.microsoft.com/office/drawing/2014/main" id="{DBE294AB-0600-E14B-8CF8-58996CF1344A}"/>
+              </a:ext>
+            </a:extLst>
+          </p:cNvPr>
+          <p:cNvSpPr>
+            <a:spLocks noGrp="1"/>
+          </p:cNvSpPr>
+          <p:nvPr>
+            <p:ph idx="1"/>
+          </p:nvPr>
+        </p:nvSpPr>
+        <p:spPr/>
+        <p:txBody>
+          <a:bodyPr/>
+          <a:lstStyle/>
+          <a:p>
+            <a:pPr>
+              <a:lnSpc>
+                <a:spcPct val="100000"/>
+              </a:lnSpc>
+            </a:pPr>
+            <a:r>
+              <a:rPr lang="en-US" sz="3000" dirty="0"/>
+              <a:t>-</a:t>
+            </a:r>
+            <a:r>
+              <a:rPr lang="en-US" sz="2400" dirty="0"/>
+              <a:t>Diary (</a:t>
+            </a:r>
+            <a:r>
+              <a:rPr lang="en-US" sz="2400" dirty="0">
+                <a:hlinkClick r:id="rId2"/>
+              </a:rPr>
+              <a:t>https://sites.google.com/view/buddler-joe/home</a:t>
+            </a:r>
+            <a:r>
+              <a:rPr lang="en-US" sz="2400" dirty="0"/>
+              <a:t>)</a:t>
+            </a:r>
+          </a:p>
+          <a:p>
+            <a:pPr>
+              <a:lnSpc>
+                <a:spcPct val="100000"/>
+              </a:lnSpc>
+            </a:pPr>
+            <a:endParaRPr lang="en-US" sz="2400" dirty="0"/>
+          </a:p>
+          <a:p>
+            <a:pPr>
+              <a:lnSpc>
+                <a:spcPct val="100000"/>
+              </a:lnSpc>
+            </a:pPr>
+            <a:r>
+              <a:rPr lang="en-US" sz="2400" dirty="0"/>
+              <a:t>-Source Code </a:t>
+            </a:r>
+            <a:r>
+              <a:rPr lang="en-US" sz="2400" dirty="0" err="1"/>
+              <a:t>Dokumentation</a:t>
+            </a:r>
+            <a:endParaRPr lang="en-US" sz="2400" dirty="0"/>
+          </a:p>
+          <a:p>
+            <a:pPr>
+              <a:lnSpc>
+                <a:spcPct val="100000"/>
+              </a:lnSpc>
+            </a:pPr>
+            <a:endParaRPr lang="en-US" sz="2400" dirty="0"/>
+          </a:p>
+          <a:p>
+            <a:pPr>
+              <a:lnSpc>
+                <a:spcPct val="100000"/>
+              </a:lnSpc>
+            </a:pPr>
+            <a:r>
+              <a:rPr lang="en-US" sz="2400" dirty="0"/>
+              <a:t>-QA </a:t>
+            </a:r>
+            <a:r>
+              <a:rPr lang="en-US" sz="2400" dirty="0" err="1"/>
+              <a:t>Dokumentation</a:t>
+            </a:r>
+            <a:endParaRPr lang="en-US" sz="2400" dirty="0"/>
+          </a:p>
+          <a:p>
+            <a:pPr>
+              <a:lnSpc>
+                <a:spcPct val="100000"/>
+              </a:lnSpc>
+            </a:pPr>
+            <a:endParaRPr lang="en-US" sz="2400" dirty="0"/>
+          </a:p>
+          <a:p>
+            <a:pPr>
+              <a:lnSpc>
+                <a:spcPct val="100000"/>
+              </a:lnSpc>
+            </a:pPr>
+            <a:r>
+              <a:rPr lang="en-US" sz="2400" dirty="0"/>
+              <a:t>-</a:t>
+            </a:r>
+            <a:r>
+              <a:rPr lang="en-US" sz="2400" dirty="0" err="1"/>
+              <a:t>Protokolle</a:t>
+            </a:r>
+            <a:r>
+              <a:rPr lang="en-US" sz="2400" dirty="0"/>
+              <a:t> der </a:t>
+            </a:r>
+            <a:r>
+              <a:rPr lang="en-US" sz="2400" dirty="0" err="1"/>
+              <a:t>Sitzungen</a:t>
+            </a:r>
+            <a:endParaRPr lang="en-US" sz="2400" dirty="0"/>
+          </a:p>
+          <a:p>
+            <a:pPr>
+              <a:lnSpc>
+                <a:spcPct val="100000"/>
+              </a:lnSpc>
+            </a:pPr>
+            <a:endParaRPr lang="en-US" sz="2400" dirty="0"/>
+          </a:p>
+          <a:p>
+            <a:pPr>
+              <a:lnSpc>
+                <a:spcPct val="100000"/>
+              </a:lnSpc>
+            </a:pPr>
+            <a:r>
+              <a:rPr lang="en-US" sz="2400" dirty="0"/>
+              <a:t>-etc.</a:t>
+            </a:r>
+          </a:p>
+          <a:p>
+            <a:pPr>
+              <a:lnSpc>
+                <a:spcPct val="100000"/>
+              </a:lnSpc>
+            </a:pPr>
+            <a:endParaRPr lang="en-US" sz="2400" dirty="0"/>
+          </a:p>
+          <a:p>
+            <a:pPr>
+              <a:lnSpc>
+                <a:spcPct val="100000"/>
+              </a:lnSpc>
+            </a:pPr>
+            <a:r>
+              <a:rPr lang="en-US" sz="2400" dirty="0"/>
+              <a:t>-</a:t>
+            </a:r>
+            <a:r>
+              <a:rPr lang="en-US" sz="2400" dirty="0" err="1"/>
+              <a:t>Dokumentation</a:t>
+            </a:r>
+            <a:r>
+              <a:rPr lang="en-US" sz="2400" dirty="0"/>
+              <a:t> </a:t>
+            </a:r>
+            <a:r>
+              <a:rPr lang="en-US" sz="2400" dirty="0" err="1"/>
+              <a:t>im</a:t>
+            </a:r>
+            <a:r>
+              <a:rPr lang="en-US" sz="2400" dirty="0"/>
+              <a:t> git</a:t>
             </a:r>
           </a:p>
         </p:txBody>
@@ -4893,7 +5846,7 @@
     </p:spTree>
     <p:extLst>
       <p:ext uri="{BB962C8B-B14F-4D97-AF65-F5344CB8AC3E}">
-        <p14:creationId xmlns:p14="http://schemas.microsoft.com/office/powerpoint/2010/main" val="69276885"/>
+        <p14:creationId xmlns:p14="http://schemas.microsoft.com/office/powerpoint/2010/main" val="787146101"/>
       </p:ext>
     </p:extLst>
   </p:cSld>

</xml_diff>

<commit_message>
added QR-code to Presentation
</commit_message>
<xml_diff>
--- a/Presentations/Milestone 1/Präsentation_Buddler_Joe.pptx
+++ b/Presentations/Milestone 1/Präsentation_Buddler_Joe.pptx
@@ -391,7 +391,7 @@
           <a:p>
             <a:fld id="{484FEB8E-57CB-43C0-BEF7-4F4116A5252C}" type="datetimeFigureOut">
               <a:rPr lang="de-CH" smtClean="0"/>
-              <a:t>04.03.19</a:t>
+              <a:t>04.03.2019</a:t>
             </a:fld>
             <a:endParaRPr lang="de-CH"/>
           </a:p>
@@ -550,7 +550,7 @@
           <a:p>
             <a:fld id="{DA53D58F-CC03-47C4-AC79-D3C984A61519}" type="slidenum">
               <a:rPr lang="de-CH" smtClean="0"/>
-              <a:t>‹#›</a:t>
+              <a:t>‹Nr.›</a:t>
             </a:fld>
             <a:endParaRPr lang="de-CH"/>
           </a:p>
@@ -1003,7 +1003,7 @@
             <a:fld id="{B3811826-9277-4232-A2B5-17D05DFC7392}" type="slidenum">
               <a:rPr lang="de-CH" smtClean="0"/>
               <a:pPr/>
-              <a:t>‹#›</a:t>
+              <a:t>‹Nr.›</a:t>
             </a:fld>
             <a:endParaRPr lang="de-CH" dirty="0"/>
           </a:p>
@@ -1500,7 +1500,7 @@
             <a:fld id="{B3811826-9277-4232-A2B5-17D05DFC7392}" type="slidenum">
               <a:rPr lang="de-CH" smtClean="0"/>
               <a:pPr/>
-              <a:t>‹#›</a:t>
+              <a:t>‹Nr.›</a:t>
             </a:fld>
             <a:endParaRPr lang="de-CH" dirty="0"/>
           </a:p>
@@ -1624,7 +1624,7 @@
             <a:fld id="{B3811826-9277-4232-A2B5-17D05DFC7392}" type="slidenum">
               <a:rPr lang="de-CH" smtClean="0"/>
               <a:pPr/>
-              <a:t>‹#›</a:t>
+              <a:t>‹Nr.›</a:t>
             </a:fld>
             <a:endParaRPr lang="de-CH" dirty="0"/>
           </a:p>
@@ -1849,7 +1849,7 @@
             <a:fld id="{B3811826-9277-4232-A2B5-17D05DFC7392}" type="slidenum">
               <a:rPr lang="de-CH" smtClean="0"/>
               <a:pPr/>
-              <a:t>‹#›</a:t>
+              <a:t>‹Nr.›</a:t>
             </a:fld>
             <a:endParaRPr lang="de-CH" dirty="0"/>
           </a:p>
@@ -2175,7 +2175,7 @@
             <a:fld id="{B3811826-9277-4232-A2B5-17D05DFC7392}" type="slidenum">
               <a:rPr lang="de-CH" smtClean="0"/>
               <a:pPr/>
-              <a:t>‹#›</a:t>
+              <a:t>‹Nr.›</a:t>
             </a:fld>
             <a:endParaRPr lang="de-CH" dirty="0"/>
           </a:p>
@@ -2579,7 +2579,7 @@
             <a:fld id="{B3811826-9277-4232-A2B5-17D05DFC7392}" type="slidenum">
               <a:rPr lang="de-CH" smtClean="0"/>
               <a:pPr/>
-              <a:t>‹#›</a:t>
+              <a:t>‹Nr.›</a:t>
             </a:fld>
             <a:endParaRPr lang="de-CH" dirty="0"/>
           </a:p>
@@ -2862,7 +2862,7 @@
             <a:fld id="{B3811826-9277-4232-A2B5-17D05DFC7392}" type="slidenum">
               <a:rPr lang="de-CH" smtClean="0"/>
               <a:pPr/>
-              <a:t>‹#›</a:t>
+              <a:t>‹Nr.›</a:t>
             </a:fld>
             <a:endParaRPr lang="de-CH" dirty="0"/>
           </a:p>
@@ -3107,7 +3107,7 @@
             <a:fld id="{B3811826-9277-4232-A2B5-17D05DFC7392}" type="slidenum">
               <a:rPr lang="de-CH" smtClean="0"/>
               <a:pPr/>
-              <a:t>‹#›</a:t>
+              <a:t>‹Nr.›</a:t>
             </a:fld>
             <a:endParaRPr lang="de-CH" dirty="0"/>
           </a:p>
@@ -7560,6 +7560,42 @@
           </a:p>
         </p:txBody>
       </p:sp>
+      <p:pic>
+        <p:nvPicPr>
+          <p:cNvPr id="7" name="Grafik 6">
+            <a:extLst>
+              <a:ext uri="{FF2B5EF4-FFF2-40B4-BE49-F238E27FC236}">
+                <a16:creationId xmlns:a16="http://schemas.microsoft.com/office/drawing/2014/main" id="{C9842787-2DAC-4B41-A3E0-E2582247E604}"/>
+              </a:ext>
+            </a:extLst>
+          </p:cNvPr>
+          <p:cNvPicPr>
+            <a:picLocks noChangeAspect="1"/>
+          </p:cNvPicPr>
+          <p:nvPr/>
+        </p:nvPicPr>
+        <p:blipFill>
+          <a:blip r:embed="rId3">
+            <a:extLst>
+              <a:ext uri="{28A0092B-C50C-407E-A947-70E740481C1C}">
+                <a14:useLocalDpi xmlns:a14="http://schemas.microsoft.com/office/drawing/2010/main" val="0"/>
+              </a:ext>
+            </a:extLst>
+          </a:blip>
+          <a:stretch>
+            <a:fillRect/>
+          </a:stretch>
+        </p:blipFill>
+        <p:spPr>
+          <a:xfrm>
+            <a:off x="6185588" y="3523457"/>
+            <a:ext cx="2857500" cy="2857500"/>
+          </a:xfrm>
+          <a:prstGeom prst="rect">
+            <a:avLst/>
+          </a:prstGeom>
+        </p:spPr>
+      </p:pic>
     </p:spTree>
     <p:extLst>
       <p:ext uri="{BB962C8B-B14F-4D97-AF65-F5344CB8AC3E}">

</xml_diff>

<commit_message>
Updated the Ablauf and reorganized it
</commit_message>
<xml_diff>
--- a/Presentations/Milestone 1/Präsentation_Buddler_Joe.pptx
+++ b/Presentations/Milestone 1/Präsentation_Buddler_Joe.pptx
@@ -23,14 +23,14 @@
     <p:sldId id="293" r:id="rId14"/>
     <p:sldId id="294" r:id="rId15"/>
     <p:sldId id="295" r:id="rId16"/>
-    <p:sldId id="279" r:id="rId17"/>
-    <p:sldId id="280" r:id="rId18"/>
-    <p:sldId id="277" r:id="rId19"/>
-    <p:sldId id="281" r:id="rId20"/>
-    <p:sldId id="297" r:id="rId21"/>
-    <p:sldId id="298" r:id="rId22"/>
-    <p:sldId id="299" r:id="rId23"/>
-    <p:sldId id="282" r:id="rId24"/>
+    <p:sldId id="280" r:id="rId17"/>
+    <p:sldId id="277" r:id="rId18"/>
+    <p:sldId id="279" r:id="rId19"/>
+    <p:sldId id="282" r:id="rId20"/>
+    <p:sldId id="281" r:id="rId21"/>
+    <p:sldId id="297" r:id="rId22"/>
+    <p:sldId id="298" r:id="rId23"/>
+    <p:sldId id="299" r:id="rId24"/>
     <p:sldId id="283" r:id="rId25"/>
     <p:sldId id="276" r:id="rId26"/>
   </p:sldIdLst>
@@ -392,7 +392,7 @@
           <a:p>
             <a:fld id="{484FEB8E-57CB-43C0-BEF7-4F4116A5252C}" type="datetimeFigureOut">
               <a:rPr lang="de-CH" smtClean="0"/>
-              <a:t>04.03.2019</a:t>
+              <a:t>05.03.19</a:t>
             </a:fld>
             <a:endParaRPr lang="de-CH"/>
           </a:p>
@@ -551,7 +551,7 @@
           <a:p>
             <a:fld id="{DA53D58F-CC03-47C4-AC79-D3C984A61519}" type="slidenum">
               <a:rPr lang="de-CH" smtClean="0"/>
-              <a:t>‹Nr.›</a:t>
+              <a:t>‹#›</a:t>
             </a:fld>
             <a:endParaRPr lang="de-CH"/>
           </a:p>
@@ -1004,7 +1004,7 @@
             <a:fld id="{B3811826-9277-4232-A2B5-17D05DFC7392}" type="slidenum">
               <a:rPr lang="de-CH" smtClean="0"/>
               <a:pPr/>
-              <a:t>‹Nr.›</a:t>
+              <a:t>‹#›</a:t>
             </a:fld>
             <a:endParaRPr lang="de-CH" dirty="0"/>
           </a:p>
@@ -1501,7 +1501,7 @@
             <a:fld id="{B3811826-9277-4232-A2B5-17D05DFC7392}" type="slidenum">
               <a:rPr lang="de-CH" smtClean="0"/>
               <a:pPr/>
-              <a:t>‹Nr.›</a:t>
+              <a:t>‹#›</a:t>
             </a:fld>
             <a:endParaRPr lang="de-CH" dirty="0"/>
           </a:p>
@@ -1625,7 +1625,7 @@
             <a:fld id="{B3811826-9277-4232-A2B5-17D05DFC7392}" type="slidenum">
               <a:rPr lang="de-CH" smtClean="0"/>
               <a:pPr/>
-              <a:t>‹Nr.›</a:t>
+              <a:t>‹#›</a:t>
             </a:fld>
             <a:endParaRPr lang="de-CH" dirty="0"/>
           </a:p>
@@ -1850,7 +1850,7 @@
             <a:fld id="{B3811826-9277-4232-A2B5-17D05DFC7392}" type="slidenum">
               <a:rPr lang="de-CH" smtClean="0"/>
               <a:pPr/>
-              <a:t>‹Nr.›</a:t>
+              <a:t>‹#›</a:t>
             </a:fld>
             <a:endParaRPr lang="de-CH" dirty="0"/>
           </a:p>
@@ -2176,7 +2176,7 @@
             <a:fld id="{B3811826-9277-4232-A2B5-17D05DFC7392}" type="slidenum">
               <a:rPr lang="de-CH" smtClean="0"/>
               <a:pPr/>
-              <a:t>‹Nr.›</a:t>
+              <a:t>‹#›</a:t>
             </a:fld>
             <a:endParaRPr lang="de-CH" dirty="0"/>
           </a:p>
@@ -2580,7 +2580,7 @@
             <a:fld id="{B3811826-9277-4232-A2B5-17D05DFC7392}" type="slidenum">
               <a:rPr lang="de-CH" smtClean="0"/>
               <a:pPr/>
-              <a:t>‹Nr.›</a:t>
+              <a:t>‹#›</a:t>
             </a:fld>
             <a:endParaRPr lang="de-CH" dirty="0"/>
           </a:p>
@@ -2863,7 +2863,7 @@
             <a:fld id="{B3811826-9277-4232-A2B5-17D05DFC7392}" type="slidenum">
               <a:rPr lang="de-CH" smtClean="0"/>
               <a:pPr/>
-              <a:t>‹Nr.›</a:t>
+              <a:t>‹#›</a:t>
             </a:fld>
             <a:endParaRPr lang="de-CH" dirty="0"/>
           </a:p>
@@ -3108,7 +3108,7 @@
             <a:fld id="{B3811826-9277-4232-A2B5-17D05DFC7392}" type="slidenum">
               <a:rPr lang="de-CH" smtClean="0"/>
               <a:pPr/>
-              <a:t>‹Nr.›</a:t>
+              <a:t>‹#›</a:t>
             </a:fld>
             <a:endParaRPr lang="de-CH" dirty="0"/>
           </a:p>
@@ -5807,11 +5807,11 @@
           <a:lstStyle/>
           <a:p>
             <a:br>
-              <a:rPr lang="de-CH" sz="3200" dirty="0"/>
+              <a:rPr lang="de-CH" sz="3600" dirty="0"/>
             </a:br>
             <a:r>
-              <a:rPr lang="de-CH" sz="3000" dirty="0"/>
-              <a:t>Schnittstelle zwischen Client und Server</a:t>
+              <a:rPr lang="de-CH" sz="3600" dirty="0"/>
+              <a:t>Spielmechaniken</a:t>
             </a:r>
           </a:p>
         </p:txBody>
@@ -5831,10 +5831,53 @@
           <a:bodyPr/>
           <a:lstStyle/>
           <a:p>
+            <a:endParaRPr lang="de-CH" sz="2400" dirty="0"/>
+          </a:p>
+          <a:p>
+            <a:pPr lvl="1"/>
             <a:r>
               <a:rPr lang="de-CH" sz="2400" dirty="0"/>
-              <a:t>TODO:</a:t>
-            </a:r>
+              <a:t>Bewegung der Spielfigur</a:t>
+            </a:r>
+          </a:p>
+          <a:p>
+            <a:pPr lvl="1"/>
+            <a:endParaRPr lang="de-CH" sz="2400" dirty="0"/>
+          </a:p>
+          <a:p>
+            <a:pPr lvl="1"/>
+            <a:r>
+              <a:rPr lang="de-CH" sz="2400" dirty="0"/>
+              <a:t>Interaktion mit der Umwelt</a:t>
+            </a:r>
+          </a:p>
+          <a:p>
+            <a:pPr lvl="1"/>
+            <a:endParaRPr lang="de-CH" sz="2400" dirty="0"/>
+          </a:p>
+          <a:p>
+            <a:pPr lvl="1"/>
+            <a:r>
+              <a:rPr lang="de-CH" sz="2400" dirty="0"/>
+              <a:t>Interaktion mit anderen Spielern</a:t>
+            </a:r>
+          </a:p>
+          <a:p>
+            <a:pPr lvl="1"/>
+            <a:endParaRPr lang="de-CH" sz="2400" dirty="0"/>
+          </a:p>
+          <a:p>
+            <a:pPr lvl="1"/>
+            <a:r>
+              <a:rPr lang="de-CH" sz="2400" dirty="0"/>
+              <a:t>Gewinnentscheidung</a:t>
+            </a:r>
+          </a:p>
+          <a:p>
+            <a:pPr marL="0" lvl="1" indent="0">
+              <a:buNone/>
+            </a:pPr>
+            <a:endParaRPr lang="de-CH" sz="2400" dirty="0"/>
           </a:p>
         </p:txBody>
       </p:sp>
@@ -5932,7 +5975,7 @@
     </p:spTree>
     <p:extLst>
       <p:ext uri="{BB962C8B-B14F-4D97-AF65-F5344CB8AC3E}">
-        <p14:creationId xmlns:p14="http://schemas.microsoft.com/office/powerpoint/2010/main" val="1016536875"/>
+        <p14:creationId xmlns:p14="http://schemas.microsoft.com/office/powerpoint/2010/main" val="2976733399"/>
       </p:ext>
     </p:extLst>
   </p:cSld>
@@ -5979,7 +6022,7 @@
             </a:br>
             <a:r>
               <a:rPr lang="de-CH" sz="3600" dirty="0"/>
-              <a:t>Spielmechaniken</a:t>
+              <a:t>Anforderungen</a:t>
             </a:r>
           </a:p>
         </p:txBody>
@@ -6005,7 +6048,7 @@
             <a:pPr lvl="1"/>
             <a:r>
               <a:rPr lang="de-CH" sz="2400" dirty="0"/>
-              <a:t>Bewegung der Spielfigur</a:t>
+              <a:t>Echtzeitspiel</a:t>
             </a:r>
           </a:p>
           <a:p>
@@ -6016,7 +6059,7 @@
             <a:pPr lvl="1"/>
             <a:r>
               <a:rPr lang="de-CH" sz="2400" dirty="0"/>
-              <a:t>Interaktion mit der Umwelt</a:t>
+              <a:t>Spielwelt</a:t>
             </a:r>
           </a:p>
           <a:p>
@@ -6027,7 +6070,7 @@
             <a:pPr lvl="1"/>
             <a:r>
               <a:rPr lang="de-CH" sz="2400" dirty="0"/>
-              <a:t>Interaktion mit anderen Spielern</a:t>
+              <a:t>Position und Kollisionserkennung</a:t>
             </a:r>
           </a:p>
           <a:p>
@@ -6038,14 +6081,30 @@
             <a:pPr lvl="1"/>
             <a:r>
               <a:rPr lang="de-CH" sz="2400" dirty="0"/>
-              <a:t>Gewinnentscheidung</a:t>
-            </a:r>
-          </a:p>
-          <a:p>
-            <a:pPr marL="0" lvl="1" indent="0">
-              <a:buNone/>
-            </a:pPr>
+              <a:t>Schwerkraft</a:t>
+            </a:r>
+          </a:p>
+          <a:p>
+            <a:pPr lvl="1"/>
             <a:endParaRPr lang="de-CH" sz="2400" dirty="0"/>
+          </a:p>
+          <a:p>
+            <a:pPr lvl="1"/>
+            <a:r>
+              <a:rPr lang="de-CH" sz="2400" dirty="0"/>
+              <a:t>Animation</a:t>
+            </a:r>
+          </a:p>
+          <a:p>
+            <a:pPr lvl="1"/>
+            <a:endParaRPr lang="de-CH" sz="2400" dirty="0"/>
+          </a:p>
+          <a:p>
+            <a:pPr lvl="1"/>
+            <a:r>
+              <a:rPr lang="de-CH" sz="2400" dirty="0"/>
+              <a:t>Sound</a:t>
+            </a:r>
           </a:p>
         </p:txBody>
       </p:sp>
@@ -6143,7 +6202,7 @@
     </p:spTree>
     <p:extLst>
       <p:ext uri="{BB962C8B-B14F-4D97-AF65-F5344CB8AC3E}">
-        <p14:creationId xmlns:p14="http://schemas.microsoft.com/office/powerpoint/2010/main" val="2976733399"/>
+        <p14:creationId xmlns:p14="http://schemas.microsoft.com/office/powerpoint/2010/main" val="2261292736"/>
       </p:ext>
     </p:extLst>
   </p:cSld>
@@ -6186,11 +6245,11 @@
           <a:lstStyle/>
           <a:p>
             <a:br>
-              <a:rPr lang="de-CH" sz="3600" dirty="0"/>
+              <a:rPr lang="de-CH" sz="3200" dirty="0"/>
             </a:br>
             <a:r>
-              <a:rPr lang="de-CH" sz="3600" dirty="0"/>
-              <a:t>Anforderungen</a:t>
+              <a:rPr lang="de-CH" sz="3000" dirty="0"/>
+              <a:t>Schnittstelle zwischen Client und Server</a:t>
             </a:r>
           </a:p>
         </p:txBody>
@@ -6210,68 +6269,9 @@
           <a:bodyPr/>
           <a:lstStyle/>
           <a:p>
-            <a:endParaRPr lang="de-CH" sz="2400" dirty="0"/>
-          </a:p>
-          <a:p>
-            <a:pPr lvl="1"/>
             <a:r>
               <a:rPr lang="de-CH" sz="2400" dirty="0"/>
-              <a:t>Echtzeitspiel</a:t>
-            </a:r>
-          </a:p>
-          <a:p>
-            <a:pPr lvl="1"/>
-            <a:endParaRPr lang="de-CH" sz="2400" dirty="0"/>
-          </a:p>
-          <a:p>
-            <a:pPr lvl="1"/>
-            <a:r>
-              <a:rPr lang="de-CH" sz="2400" dirty="0"/>
-              <a:t>Spielwelt</a:t>
-            </a:r>
-          </a:p>
-          <a:p>
-            <a:pPr lvl="1"/>
-            <a:endParaRPr lang="de-CH" sz="2400" dirty="0"/>
-          </a:p>
-          <a:p>
-            <a:pPr lvl="1"/>
-            <a:r>
-              <a:rPr lang="de-CH" sz="2400" dirty="0"/>
-              <a:t>Position und Kollisionserkennung</a:t>
-            </a:r>
-          </a:p>
-          <a:p>
-            <a:pPr lvl="1"/>
-            <a:endParaRPr lang="de-CH" sz="2400" dirty="0"/>
-          </a:p>
-          <a:p>
-            <a:pPr lvl="1"/>
-            <a:r>
-              <a:rPr lang="de-CH" sz="2400" dirty="0"/>
-              <a:t>Schwerkraft</a:t>
-            </a:r>
-          </a:p>
-          <a:p>
-            <a:pPr lvl="1"/>
-            <a:endParaRPr lang="de-CH" sz="2400" dirty="0"/>
-          </a:p>
-          <a:p>
-            <a:pPr lvl="1"/>
-            <a:r>
-              <a:rPr lang="de-CH" sz="2400" dirty="0"/>
-              <a:t>Animation</a:t>
-            </a:r>
-          </a:p>
-          <a:p>
-            <a:pPr lvl="1"/>
-            <a:endParaRPr lang="de-CH" sz="2400" dirty="0"/>
-          </a:p>
-          <a:p>
-            <a:pPr lvl="1"/>
-            <a:r>
-              <a:rPr lang="de-CH" sz="2400" dirty="0"/>
-              <a:t>Sound</a:t>
+              <a:t>TODO:</a:t>
             </a:r>
           </a:p>
         </p:txBody>
@@ -6370,7 +6370,7 @@
     </p:spTree>
     <p:extLst>
       <p:ext uri="{BB962C8B-B14F-4D97-AF65-F5344CB8AC3E}">
-        <p14:creationId xmlns:p14="http://schemas.microsoft.com/office/powerpoint/2010/main" val="2261292736"/>
+        <p14:creationId xmlns:p14="http://schemas.microsoft.com/office/powerpoint/2010/main" val="1016536875"/>
       </p:ext>
     </p:extLst>
   </p:cSld>
@@ -6417,6 +6417,557 @@
             </a:br>
             <a:r>
               <a:rPr lang="de-CH" sz="3600" dirty="0"/>
+              <a:t>Zuständigkeiten</a:t>
+            </a:r>
+          </a:p>
+        </p:txBody>
+      </p:sp>
+      <p:sp>
+        <p:nvSpPr>
+          <p:cNvPr id="3" name="Inhaltsplatzhalter 2"/>
+          <p:cNvSpPr>
+            <a:spLocks noGrp="1"/>
+          </p:cNvSpPr>
+          <p:nvPr>
+            <p:ph idx="1"/>
+          </p:nvPr>
+        </p:nvSpPr>
+        <p:spPr/>
+        <p:txBody>
+          <a:bodyPr/>
+          <a:lstStyle/>
+          <a:p>
+            <a:pPr>
+              <a:lnSpc>
+                <a:spcPct val="100000"/>
+              </a:lnSpc>
+            </a:pPr>
+            <a:r>
+              <a:rPr lang="de-CH" sz="2400" dirty="0"/>
+              <a:t>-Matthias:</a:t>
+            </a:r>
+          </a:p>
+          <a:p>
+            <a:pPr>
+              <a:lnSpc>
+                <a:spcPct val="100000"/>
+              </a:lnSpc>
+            </a:pPr>
+            <a:r>
+              <a:rPr lang="de-CH" sz="2400" dirty="0"/>
+              <a:t>	Engine, Game Logik, QA</a:t>
+            </a:r>
+          </a:p>
+          <a:p>
+            <a:pPr>
+              <a:lnSpc>
+                <a:spcPct val="100000"/>
+              </a:lnSpc>
+            </a:pPr>
+            <a:r>
+              <a:rPr lang="de-CH" sz="2400" dirty="0"/>
+              <a:t>-Moritz:</a:t>
+            </a:r>
+          </a:p>
+          <a:p>
+            <a:pPr>
+              <a:lnSpc>
+                <a:spcPct val="100000"/>
+              </a:lnSpc>
+            </a:pPr>
+            <a:r>
+              <a:rPr lang="de-CH" sz="2400" dirty="0"/>
+              <a:t>	Client, Grafik</a:t>
+            </a:r>
+          </a:p>
+          <a:p>
+            <a:pPr>
+              <a:lnSpc>
+                <a:spcPct val="100000"/>
+              </a:lnSpc>
+            </a:pPr>
+            <a:r>
+              <a:rPr lang="de-CH" sz="2400" dirty="0"/>
+              <a:t>-Sanja:</a:t>
+            </a:r>
+          </a:p>
+          <a:p>
+            <a:pPr>
+              <a:lnSpc>
+                <a:spcPct val="100000"/>
+              </a:lnSpc>
+            </a:pPr>
+            <a:r>
+              <a:rPr lang="de-CH" sz="2400" dirty="0"/>
+              <a:t>	Server, QA</a:t>
+            </a:r>
+          </a:p>
+          <a:p>
+            <a:pPr>
+              <a:lnSpc>
+                <a:spcPct val="100000"/>
+              </a:lnSpc>
+            </a:pPr>
+            <a:r>
+              <a:rPr lang="de-CH" sz="2400" dirty="0"/>
+              <a:t>-Sebastian:</a:t>
+            </a:r>
+          </a:p>
+          <a:p>
+            <a:pPr>
+              <a:lnSpc>
+                <a:spcPct val="100000"/>
+              </a:lnSpc>
+            </a:pPr>
+            <a:r>
+              <a:rPr lang="de-CH" sz="2400" dirty="0"/>
+              <a:t>	Grafik, Game Logik</a:t>
+            </a:r>
+          </a:p>
+          <a:p>
+            <a:pPr>
+              <a:lnSpc>
+                <a:spcPct val="100000"/>
+              </a:lnSpc>
+            </a:pPr>
+            <a:r>
+              <a:rPr lang="de-CH" sz="2400" dirty="0"/>
+              <a:t>-Viktor:</a:t>
+            </a:r>
+          </a:p>
+          <a:p>
+            <a:pPr>
+              <a:lnSpc>
+                <a:spcPct val="100000"/>
+              </a:lnSpc>
+            </a:pPr>
+            <a:r>
+              <a:rPr lang="de-CH" sz="2400" dirty="0"/>
+              <a:t>	Client/Server Kommunikation, Server</a:t>
+            </a:r>
+          </a:p>
+        </p:txBody>
+      </p:sp>
+      <p:sp>
+        <p:nvSpPr>
+          <p:cNvPr id="4" name="Datumsplatzhalter 3"/>
+          <p:cNvSpPr>
+            <a:spLocks noGrp="1"/>
+          </p:cNvSpPr>
+          <p:nvPr>
+            <p:ph type="dt" sz="half" idx="10"/>
+          </p:nvPr>
+        </p:nvSpPr>
+        <p:spPr>
+          <a:xfrm>
+            <a:off x="431800" y="6524626"/>
+            <a:ext cx="3204096" cy="180000"/>
+          </a:xfrm>
+        </p:spPr>
+        <p:txBody>
+          <a:bodyPr/>
+          <a:lstStyle/>
+          <a:p>
+            <a:r>
+              <a:rPr lang="de-CH" dirty="0"/>
+              <a:t>Meilenstein 1, </a:t>
+            </a:r>
+            <a:r>
+              <a:rPr lang="de-CH" dirty="0" err="1"/>
+              <a:t>Joe’s</a:t>
+            </a:r>
+            <a:r>
+              <a:rPr lang="de-CH" dirty="0"/>
+              <a:t> </a:t>
+            </a:r>
+            <a:r>
+              <a:rPr lang="de-CH" dirty="0" err="1"/>
+              <a:t>Buddler</a:t>
+            </a:r>
+            <a:r>
+              <a:rPr lang="de-CH" dirty="0"/>
+              <a:t> Corp., Feb 2019  </a:t>
+            </a:r>
+          </a:p>
+        </p:txBody>
+      </p:sp>
+      <p:sp>
+        <p:nvSpPr>
+          <p:cNvPr id="5" name="Fußzeilenplatzhalter 4"/>
+          <p:cNvSpPr>
+            <a:spLocks noGrp="1"/>
+          </p:cNvSpPr>
+          <p:nvPr>
+            <p:ph type="ftr" sz="quarter" idx="11"/>
+          </p:nvPr>
+        </p:nvSpPr>
+        <p:spPr/>
+        <p:txBody>
+          <a:bodyPr/>
+          <a:lstStyle/>
+          <a:p>
+            <a:pPr algn="r"/>
+            <a:r>
+              <a:rPr lang="de-CH"/>
+              <a:t>Universität Basel</a:t>
+            </a:r>
+            <a:endParaRPr lang="de-CH" dirty="0"/>
+          </a:p>
+        </p:txBody>
+      </p:sp>
+      <p:sp>
+        <p:nvSpPr>
+          <p:cNvPr id="6" name="Foliennummernplatzhalter 5"/>
+          <p:cNvSpPr>
+            <a:spLocks noGrp="1"/>
+          </p:cNvSpPr>
+          <p:nvPr>
+            <p:ph type="sldNum" sz="quarter" idx="12"/>
+          </p:nvPr>
+        </p:nvSpPr>
+        <p:spPr/>
+        <p:txBody>
+          <a:bodyPr/>
+          <a:lstStyle/>
+          <a:p>
+            <a:fld id="{B3811826-9277-4232-A2B5-17D05DFC7392}" type="slidenum">
+              <a:rPr lang="de-CH" smtClean="0"/>
+              <a:pPr/>
+              <a:t>19</a:t>
+            </a:fld>
+            <a:endParaRPr lang="de-CH" dirty="0"/>
+          </a:p>
+        </p:txBody>
+      </p:sp>
+    </p:spTree>
+    <p:extLst>
+      <p:ext uri="{BB962C8B-B14F-4D97-AF65-F5344CB8AC3E}">
+        <p14:creationId xmlns:p14="http://schemas.microsoft.com/office/powerpoint/2010/main" val="2859989666"/>
+      </p:ext>
+    </p:extLst>
+  </p:cSld>
+  <p:clrMapOvr>
+    <a:masterClrMapping/>
+  </p:clrMapOvr>
+</p:sld>
+</file>
+
+<file path=ppt/slides/slide2.xml><?xml version="1.0" encoding="utf-8"?>
+<p:sld xmlns:a="http://schemas.openxmlformats.org/drawingml/2006/main" xmlns:r="http://schemas.openxmlformats.org/officeDocument/2006/relationships" xmlns:p="http://schemas.openxmlformats.org/presentationml/2006/main">
+  <p:cSld>
+    <p:spTree>
+      <p:nvGrpSpPr>
+        <p:cNvPr id="1" name=""/>
+        <p:cNvGrpSpPr/>
+        <p:nvPr/>
+      </p:nvGrpSpPr>
+      <p:grpSpPr>
+        <a:xfrm>
+          <a:off x="0" y="0"/>
+          <a:ext cx="0" cy="0"/>
+          <a:chOff x="0" y="0"/>
+          <a:chExt cx="0" cy="0"/>
+        </a:xfrm>
+      </p:grpSpPr>
+      <p:sp>
+        <p:nvSpPr>
+          <p:cNvPr id="2" name="Titel 1"/>
+          <p:cNvSpPr>
+            <a:spLocks noGrp="1"/>
+          </p:cNvSpPr>
+          <p:nvPr>
+            <p:ph type="title"/>
+          </p:nvPr>
+        </p:nvSpPr>
+        <p:spPr/>
+        <p:txBody>
+          <a:bodyPr/>
+          <a:lstStyle/>
+          <a:p>
+            <a:br>
+              <a:rPr lang="de-CH" sz="3600" dirty="0"/>
+            </a:br>
+            <a:r>
+              <a:rPr lang="de-CH" sz="3600" dirty="0"/>
+              <a:t>Ablauf</a:t>
+            </a:r>
+          </a:p>
+        </p:txBody>
+      </p:sp>
+      <p:sp>
+        <p:nvSpPr>
+          <p:cNvPr id="3" name="Inhaltsplatzhalter 2"/>
+          <p:cNvSpPr>
+            <a:spLocks noGrp="1"/>
+          </p:cNvSpPr>
+          <p:nvPr>
+            <p:ph idx="1"/>
+          </p:nvPr>
+        </p:nvSpPr>
+        <p:spPr/>
+        <p:txBody>
+          <a:bodyPr/>
+          <a:lstStyle/>
+          <a:p>
+            <a:pPr marL="457200" indent="-457200">
+              <a:lnSpc>
+                <a:spcPct val="150000"/>
+              </a:lnSpc>
+              <a:buFont typeface="+mj-lt"/>
+              <a:buAutoNum type="arabicPeriod"/>
+            </a:pPr>
+            <a:r>
+              <a:rPr lang="de-CH" sz="2400" dirty="0"/>
+              <a:t>Spielbeschreibung / Idee</a:t>
+            </a:r>
+          </a:p>
+          <a:p>
+            <a:pPr marL="457200" indent="-457200">
+              <a:lnSpc>
+                <a:spcPct val="150000"/>
+              </a:lnSpc>
+              <a:buFont typeface="+mj-lt"/>
+              <a:buAutoNum type="arabicPeriod"/>
+            </a:pPr>
+            <a:r>
+              <a:rPr lang="de-CH" sz="2400" dirty="0"/>
+              <a:t>Spielregeln</a:t>
+            </a:r>
+          </a:p>
+          <a:p>
+            <a:pPr marL="457200" indent="-457200">
+              <a:lnSpc>
+                <a:spcPct val="150000"/>
+              </a:lnSpc>
+              <a:buFont typeface="+mj-lt"/>
+              <a:buAutoNum type="arabicPeriod"/>
+            </a:pPr>
+            <a:r>
+              <a:rPr lang="de-CH" sz="2400" dirty="0"/>
+              <a:t>Spielmechaniken</a:t>
+            </a:r>
+          </a:p>
+          <a:p>
+            <a:pPr marL="457200" indent="-457200">
+              <a:lnSpc>
+                <a:spcPct val="150000"/>
+              </a:lnSpc>
+              <a:buFont typeface="+mj-lt"/>
+              <a:buAutoNum type="arabicPeriod"/>
+            </a:pPr>
+            <a:r>
+              <a:rPr lang="de-CH" sz="2400" dirty="0"/>
+              <a:t>Anforderungen</a:t>
+            </a:r>
+          </a:p>
+          <a:p>
+            <a:pPr marL="457200" indent="-457200">
+              <a:lnSpc>
+                <a:spcPct val="150000"/>
+              </a:lnSpc>
+              <a:buFont typeface="+mj-lt"/>
+              <a:buAutoNum type="arabicPeriod"/>
+            </a:pPr>
+            <a:r>
+              <a:rPr lang="de-CH" sz="2400" dirty="0"/>
+              <a:t>Schnittstelle zwischen Client und Server</a:t>
+            </a:r>
+          </a:p>
+          <a:p>
+            <a:pPr marL="457200" indent="-457200">
+              <a:lnSpc>
+                <a:spcPct val="150000"/>
+              </a:lnSpc>
+              <a:buFont typeface="+mj-lt"/>
+              <a:buAutoNum type="arabicPeriod"/>
+            </a:pPr>
+            <a:r>
+              <a:rPr lang="de-CH" sz="2400" dirty="0"/>
+              <a:t>Zuständigkeiten</a:t>
+            </a:r>
+          </a:p>
+          <a:p>
+            <a:pPr marL="457200" indent="-457200">
+              <a:lnSpc>
+                <a:spcPct val="150000"/>
+              </a:lnSpc>
+              <a:buFont typeface="+mj-lt"/>
+              <a:buAutoNum type="arabicPeriod"/>
+            </a:pPr>
+            <a:r>
+              <a:rPr lang="de-CH" sz="2400"/>
+              <a:t>Timeline</a:t>
+            </a:r>
+            <a:endParaRPr lang="de-CH" sz="2400" dirty="0"/>
+          </a:p>
+          <a:p>
+            <a:pPr marL="457200" indent="-457200">
+              <a:lnSpc>
+                <a:spcPct val="150000"/>
+              </a:lnSpc>
+              <a:buFont typeface="+mj-lt"/>
+              <a:buAutoNum type="arabicPeriod"/>
+            </a:pPr>
+            <a:r>
+              <a:rPr lang="de-CH" sz="2400" dirty="0"/>
+              <a:t>Dokumentation / Prozess</a:t>
+            </a:r>
+          </a:p>
+          <a:p>
+            <a:pPr marL="0" lvl="1" indent="0">
+              <a:buNone/>
+            </a:pPr>
+            <a:endParaRPr lang="de-DE" sz="2400" dirty="0"/>
+          </a:p>
+          <a:p>
+            <a:pPr marL="0" lvl="1" indent="0">
+              <a:buNone/>
+            </a:pPr>
+            <a:endParaRPr lang="de-CH" sz="2400" dirty="0"/>
+          </a:p>
+        </p:txBody>
+      </p:sp>
+      <p:sp>
+        <p:nvSpPr>
+          <p:cNvPr id="4" name="Datumsplatzhalter 3"/>
+          <p:cNvSpPr>
+            <a:spLocks noGrp="1"/>
+          </p:cNvSpPr>
+          <p:nvPr>
+            <p:ph type="dt" sz="half" idx="10"/>
+          </p:nvPr>
+        </p:nvSpPr>
+        <p:spPr>
+          <a:xfrm>
+            <a:off x="431800" y="6524626"/>
+            <a:ext cx="3204096" cy="180000"/>
+          </a:xfrm>
+        </p:spPr>
+        <p:txBody>
+          <a:bodyPr/>
+          <a:lstStyle/>
+          <a:p>
+            <a:r>
+              <a:rPr lang="de-CH" dirty="0"/>
+              <a:t>Meilenstein 1, </a:t>
+            </a:r>
+            <a:r>
+              <a:rPr lang="de-CH" dirty="0" err="1"/>
+              <a:t>Joe’s</a:t>
+            </a:r>
+            <a:r>
+              <a:rPr lang="de-CH" dirty="0"/>
+              <a:t> </a:t>
+            </a:r>
+            <a:r>
+              <a:rPr lang="de-CH" dirty="0" err="1"/>
+              <a:t>Buddler</a:t>
+            </a:r>
+            <a:r>
+              <a:rPr lang="de-CH" dirty="0"/>
+              <a:t> Corp., Feb 2019  </a:t>
+            </a:r>
+          </a:p>
+        </p:txBody>
+      </p:sp>
+      <p:sp>
+        <p:nvSpPr>
+          <p:cNvPr id="5" name="Fußzeilenplatzhalter 4"/>
+          <p:cNvSpPr>
+            <a:spLocks noGrp="1"/>
+          </p:cNvSpPr>
+          <p:nvPr>
+            <p:ph type="ftr" sz="quarter" idx="11"/>
+          </p:nvPr>
+        </p:nvSpPr>
+        <p:spPr/>
+        <p:txBody>
+          <a:bodyPr/>
+          <a:lstStyle/>
+          <a:p>
+            <a:pPr algn="r"/>
+            <a:r>
+              <a:rPr lang="de-CH"/>
+              <a:t>Universität Basel</a:t>
+            </a:r>
+            <a:endParaRPr lang="de-CH" dirty="0"/>
+          </a:p>
+        </p:txBody>
+      </p:sp>
+      <p:sp>
+        <p:nvSpPr>
+          <p:cNvPr id="6" name="Foliennummernplatzhalter 5"/>
+          <p:cNvSpPr>
+            <a:spLocks noGrp="1"/>
+          </p:cNvSpPr>
+          <p:nvPr>
+            <p:ph type="sldNum" sz="quarter" idx="12"/>
+          </p:nvPr>
+        </p:nvSpPr>
+        <p:spPr/>
+        <p:txBody>
+          <a:bodyPr/>
+          <a:lstStyle/>
+          <a:p>
+            <a:fld id="{B3811826-9277-4232-A2B5-17D05DFC7392}" type="slidenum">
+              <a:rPr lang="de-CH" smtClean="0"/>
+              <a:pPr/>
+              <a:t>2</a:t>
+            </a:fld>
+            <a:endParaRPr lang="de-CH" dirty="0"/>
+          </a:p>
+        </p:txBody>
+      </p:sp>
+    </p:spTree>
+    <p:extLst>
+      <p:ext uri="{BB962C8B-B14F-4D97-AF65-F5344CB8AC3E}">
+        <p14:creationId xmlns:p14="http://schemas.microsoft.com/office/powerpoint/2010/main" val="335997578"/>
+      </p:ext>
+    </p:extLst>
+  </p:cSld>
+  <p:clrMapOvr>
+    <a:masterClrMapping/>
+  </p:clrMapOvr>
+</p:sld>
+</file>
+
+<file path=ppt/slides/slide20.xml><?xml version="1.0" encoding="utf-8"?>
+<p:sld xmlns:a="http://schemas.openxmlformats.org/drawingml/2006/main" xmlns:r="http://schemas.openxmlformats.org/officeDocument/2006/relationships" xmlns:p="http://schemas.openxmlformats.org/presentationml/2006/main">
+  <p:cSld>
+    <p:spTree>
+      <p:nvGrpSpPr>
+        <p:cNvPr id="1" name=""/>
+        <p:cNvGrpSpPr/>
+        <p:nvPr/>
+      </p:nvGrpSpPr>
+      <p:grpSpPr>
+        <a:xfrm>
+          <a:off x="0" y="0"/>
+          <a:ext cx="0" cy="0"/>
+          <a:chOff x="0" y="0"/>
+          <a:chExt cx="0" cy="0"/>
+        </a:xfrm>
+      </p:grpSpPr>
+      <p:sp>
+        <p:nvSpPr>
+          <p:cNvPr id="2" name="Titel 1"/>
+          <p:cNvSpPr>
+            <a:spLocks noGrp="1"/>
+          </p:cNvSpPr>
+          <p:nvPr>
+            <p:ph type="title"/>
+          </p:nvPr>
+        </p:nvSpPr>
+        <p:spPr/>
+        <p:txBody>
+          <a:bodyPr/>
+          <a:lstStyle/>
+          <a:p>
+            <a:br>
+              <a:rPr lang="de-CH" sz="3600" dirty="0"/>
+            </a:br>
+            <a:r>
+              <a:rPr lang="de-CH" sz="3600" dirty="0"/>
               <a:t>Timeline:</a:t>
             </a:r>
             <a:br>
@@ -6525,7 +7076,7 @@
             <a:fld id="{B3811826-9277-4232-A2B5-17D05DFC7392}" type="slidenum">
               <a:rPr lang="de-CH" smtClean="0"/>
               <a:pPr/>
-              <a:t>19</a:t>
+              <a:t>20</a:t>
             </a:fld>
             <a:endParaRPr lang="de-CH" dirty="0"/>
           </a:p>
@@ -6574,7 +7125,7 @@
 </p:sld>
 </file>
 
-<file path=ppt/slides/slide2.xml><?xml version="1.0" encoding="utf-8"?>
+<file path=ppt/slides/slide21.xml><?xml version="1.0" encoding="utf-8"?>
 <p:sld xmlns:a="http://schemas.openxmlformats.org/drawingml/2006/main" xmlns:r="http://schemas.openxmlformats.org/officeDocument/2006/relationships" xmlns:p="http://schemas.openxmlformats.org/presentationml/2006/main">
   <p:cSld>
     <p:spTree>
@@ -6611,284 +7162,6 @@
             </a:br>
             <a:r>
               <a:rPr lang="de-CH" sz="3600" dirty="0"/>
-              <a:t>Ablauf</a:t>
-            </a:r>
-          </a:p>
-        </p:txBody>
-      </p:sp>
-      <p:sp>
-        <p:nvSpPr>
-          <p:cNvPr id="3" name="Inhaltsplatzhalter 2"/>
-          <p:cNvSpPr>
-            <a:spLocks noGrp="1"/>
-          </p:cNvSpPr>
-          <p:nvPr>
-            <p:ph idx="1"/>
-          </p:nvPr>
-        </p:nvSpPr>
-        <p:spPr/>
-        <p:txBody>
-          <a:bodyPr/>
-          <a:lstStyle/>
-          <a:p>
-            <a:pPr marL="457200" indent="-457200">
-              <a:lnSpc>
-                <a:spcPct val="150000"/>
-              </a:lnSpc>
-              <a:buFont typeface="+mj-lt"/>
-              <a:buAutoNum type="arabicPeriod"/>
-            </a:pPr>
-            <a:r>
-              <a:rPr lang="de-CH" sz="2400" dirty="0"/>
-              <a:t>Spielbeschreibung / Idee</a:t>
-            </a:r>
-          </a:p>
-          <a:p>
-            <a:pPr marL="457200" indent="-457200">
-              <a:lnSpc>
-                <a:spcPct val="150000"/>
-              </a:lnSpc>
-              <a:buFont typeface="+mj-lt"/>
-              <a:buAutoNum type="arabicPeriod"/>
-            </a:pPr>
-            <a:r>
-              <a:rPr lang="de-CH" sz="2400" dirty="0"/>
-              <a:t>Spielregeln</a:t>
-            </a:r>
-          </a:p>
-          <a:p>
-            <a:pPr marL="457200" indent="-457200">
-              <a:lnSpc>
-                <a:spcPct val="150000"/>
-              </a:lnSpc>
-              <a:buFont typeface="+mj-lt"/>
-              <a:buAutoNum type="arabicPeriod"/>
-            </a:pPr>
-            <a:r>
-              <a:rPr lang="de-CH" sz="2400" dirty="0"/>
-              <a:t>Schnittstelle zwischen Client und Server</a:t>
-            </a:r>
-          </a:p>
-          <a:p>
-            <a:pPr marL="457200" indent="-457200">
-              <a:lnSpc>
-                <a:spcPct val="150000"/>
-              </a:lnSpc>
-              <a:buFont typeface="+mj-lt"/>
-              <a:buAutoNum type="arabicPeriod"/>
-            </a:pPr>
-            <a:r>
-              <a:rPr lang="de-CH" sz="2400" dirty="0"/>
-              <a:t>Spielmechaniken</a:t>
-            </a:r>
-          </a:p>
-          <a:p>
-            <a:pPr marL="457200" indent="-457200">
-              <a:lnSpc>
-                <a:spcPct val="150000"/>
-              </a:lnSpc>
-              <a:buFont typeface="+mj-lt"/>
-              <a:buAutoNum type="arabicPeriod"/>
-            </a:pPr>
-            <a:r>
-              <a:rPr lang="de-CH" sz="2400" dirty="0"/>
-              <a:t>Anforderungen</a:t>
-            </a:r>
-          </a:p>
-          <a:p>
-            <a:pPr marL="457200" indent="-457200">
-              <a:lnSpc>
-                <a:spcPct val="150000"/>
-              </a:lnSpc>
-              <a:buFont typeface="+mj-lt"/>
-              <a:buAutoNum type="arabicPeriod"/>
-            </a:pPr>
-            <a:r>
-              <a:rPr lang="de-CH" sz="2400" dirty="0"/>
-              <a:t>Timeline</a:t>
-            </a:r>
-          </a:p>
-          <a:p>
-            <a:pPr marL="457200" indent="-457200">
-              <a:lnSpc>
-                <a:spcPct val="150000"/>
-              </a:lnSpc>
-              <a:buFont typeface="+mj-lt"/>
-              <a:buAutoNum type="arabicPeriod"/>
-            </a:pPr>
-            <a:r>
-              <a:rPr lang="de-CH" sz="2400" dirty="0"/>
-              <a:t>Zuständigkeiten</a:t>
-            </a:r>
-          </a:p>
-          <a:p>
-            <a:pPr marL="457200" indent="-457200">
-              <a:lnSpc>
-                <a:spcPct val="150000"/>
-              </a:lnSpc>
-              <a:buFont typeface="+mj-lt"/>
-              <a:buAutoNum type="arabicPeriod"/>
-            </a:pPr>
-            <a:r>
-              <a:rPr lang="de-CH" sz="2400" dirty="0"/>
-              <a:t>Dokumentation / Prozess</a:t>
-            </a:r>
-          </a:p>
-          <a:p>
-            <a:pPr marL="0" lvl="1" indent="0">
-              <a:buNone/>
-            </a:pPr>
-            <a:endParaRPr lang="de-DE" sz="2400" dirty="0"/>
-          </a:p>
-          <a:p>
-            <a:pPr marL="0" lvl="1" indent="0">
-              <a:buNone/>
-            </a:pPr>
-            <a:endParaRPr lang="de-CH" sz="2400" dirty="0"/>
-          </a:p>
-        </p:txBody>
-      </p:sp>
-      <p:sp>
-        <p:nvSpPr>
-          <p:cNvPr id="4" name="Datumsplatzhalter 3"/>
-          <p:cNvSpPr>
-            <a:spLocks noGrp="1"/>
-          </p:cNvSpPr>
-          <p:nvPr>
-            <p:ph type="dt" sz="half" idx="10"/>
-          </p:nvPr>
-        </p:nvSpPr>
-        <p:spPr>
-          <a:xfrm>
-            <a:off x="431800" y="6524626"/>
-            <a:ext cx="3204096" cy="180000"/>
-          </a:xfrm>
-        </p:spPr>
-        <p:txBody>
-          <a:bodyPr/>
-          <a:lstStyle/>
-          <a:p>
-            <a:r>
-              <a:rPr lang="de-CH" dirty="0"/>
-              <a:t>Meilenstein 1, </a:t>
-            </a:r>
-            <a:r>
-              <a:rPr lang="de-CH" dirty="0" err="1"/>
-              <a:t>Joe’s</a:t>
-            </a:r>
-            <a:r>
-              <a:rPr lang="de-CH" dirty="0"/>
-              <a:t> </a:t>
-            </a:r>
-            <a:r>
-              <a:rPr lang="de-CH" dirty="0" err="1"/>
-              <a:t>Buddler</a:t>
-            </a:r>
-            <a:r>
-              <a:rPr lang="de-CH" dirty="0"/>
-              <a:t> Corp., Feb 2019  </a:t>
-            </a:r>
-          </a:p>
-        </p:txBody>
-      </p:sp>
-      <p:sp>
-        <p:nvSpPr>
-          <p:cNvPr id="5" name="Fußzeilenplatzhalter 4"/>
-          <p:cNvSpPr>
-            <a:spLocks noGrp="1"/>
-          </p:cNvSpPr>
-          <p:nvPr>
-            <p:ph type="ftr" sz="quarter" idx="11"/>
-          </p:nvPr>
-        </p:nvSpPr>
-        <p:spPr/>
-        <p:txBody>
-          <a:bodyPr/>
-          <a:lstStyle/>
-          <a:p>
-            <a:pPr algn="r"/>
-            <a:r>
-              <a:rPr lang="de-CH"/>
-              <a:t>Universität Basel</a:t>
-            </a:r>
-            <a:endParaRPr lang="de-CH" dirty="0"/>
-          </a:p>
-        </p:txBody>
-      </p:sp>
-      <p:sp>
-        <p:nvSpPr>
-          <p:cNvPr id="6" name="Foliennummernplatzhalter 5"/>
-          <p:cNvSpPr>
-            <a:spLocks noGrp="1"/>
-          </p:cNvSpPr>
-          <p:nvPr>
-            <p:ph type="sldNum" sz="quarter" idx="12"/>
-          </p:nvPr>
-        </p:nvSpPr>
-        <p:spPr/>
-        <p:txBody>
-          <a:bodyPr/>
-          <a:lstStyle/>
-          <a:p>
-            <a:fld id="{B3811826-9277-4232-A2B5-17D05DFC7392}" type="slidenum">
-              <a:rPr lang="de-CH" smtClean="0"/>
-              <a:pPr/>
-              <a:t>2</a:t>
-            </a:fld>
-            <a:endParaRPr lang="de-CH" dirty="0"/>
-          </a:p>
-        </p:txBody>
-      </p:sp>
-    </p:spTree>
-    <p:extLst>
-      <p:ext uri="{BB962C8B-B14F-4D97-AF65-F5344CB8AC3E}">
-        <p14:creationId xmlns:p14="http://schemas.microsoft.com/office/powerpoint/2010/main" val="335997578"/>
-      </p:ext>
-    </p:extLst>
-  </p:cSld>
-  <p:clrMapOvr>
-    <a:masterClrMapping/>
-  </p:clrMapOvr>
-</p:sld>
-</file>
-
-<file path=ppt/slides/slide20.xml><?xml version="1.0" encoding="utf-8"?>
-<p:sld xmlns:a="http://schemas.openxmlformats.org/drawingml/2006/main" xmlns:r="http://schemas.openxmlformats.org/officeDocument/2006/relationships" xmlns:p="http://schemas.openxmlformats.org/presentationml/2006/main">
-  <p:cSld>
-    <p:spTree>
-      <p:nvGrpSpPr>
-        <p:cNvPr id="1" name=""/>
-        <p:cNvGrpSpPr/>
-        <p:nvPr/>
-      </p:nvGrpSpPr>
-      <p:grpSpPr>
-        <a:xfrm>
-          <a:off x="0" y="0"/>
-          <a:ext cx="0" cy="0"/>
-          <a:chOff x="0" y="0"/>
-          <a:chExt cx="0" cy="0"/>
-        </a:xfrm>
-      </p:grpSpPr>
-      <p:sp>
-        <p:nvSpPr>
-          <p:cNvPr id="2" name="Titel 1"/>
-          <p:cNvSpPr>
-            <a:spLocks noGrp="1"/>
-          </p:cNvSpPr>
-          <p:nvPr>
-            <p:ph type="title"/>
-          </p:nvPr>
-        </p:nvSpPr>
-        <p:spPr/>
-        <p:txBody>
-          <a:bodyPr/>
-          <a:lstStyle/>
-          <a:p>
-            <a:br>
-              <a:rPr lang="de-CH" sz="3600" dirty="0"/>
-            </a:br>
-            <a:r>
-              <a:rPr lang="de-CH" sz="3600" dirty="0"/>
               <a:t>Timeline:</a:t>
             </a:r>
             <a:br>
@@ -6997,7 +7270,7 @@
             <a:fld id="{B3811826-9277-4232-A2B5-17D05DFC7392}" type="slidenum">
               <a:rPr lang="de-CH" smtClean="0"/>
               <a:pPr/>
-              <a:t>20</a:t>
+              <a:t>21</a:t>
             </a:fld>
             <a:endParaRPr lang="de-CH" dirty="0"/>
           </a:p>
@@ -7046,7 +7319,7 @@
 </p:sld>
 </file>
 
-<file path=ppt/slides/slide21.xml><?xml version="1.0" encoding="utf-8"?>
+<file path=ppt/slides/slide22.xml><?xml version="1.0" encoding="utf-8"?>
 <p:sld xmlns:a="http://schemas.openxmlformats.org/drawingml/2006/main" xmlns:r="http://schemas.openxmlformats.org/officeDocument/2006/relationships" xmlns:p="http://schemas.openxmlformats.org/presentationml/2006/main">
   <p:cSld>
     <p:spTree>
@@ -7191,7 +7464,7 @@
             <a:fld id="{B3811826-9277-4232-A2B5-17D05DFC7392}" type="slidenum">
               <a:rPr lang="de-CH" smtClean="0"/>
               <a:pPr/>
-              <a:t>21</a:t>
+              <a:t>22</a:t>
             </a:fld>
             <a:endParaRPr lang="de-CH" dirty="0"/>
           </a:p>
@@ -7240,7 +7513,7 @@
 </p:sld>
 </file>
 
-<file path=ppt/slides/slide22.xml><?xml version="1.0" encoding="utf-8"?>
+<file path=ppt/slides/slide23.xml><?xml version="1.0" encoding="utf-8"?>
 <p:sld xmlns:a="http://schemas.openxmlformats.org/drawingml/2006/main" xmlns:r="http://schemas.openxmlformats.org/officeDocument/2006/relationships" xmlns:p="http://schemas.openxmlformats.org/presentationml/2006/main">
   <p:cSld>
     <p:spTree>
@@ -7385,7 +7658,7 @@
             <a:fld id="{B3811826-9277-4232-A2B5-17D05DFC7392}" type="slidenum">
               <a:rPr lang="de-CH" smtClean="0"/>
               <a:pPr/>
-              <a:t>22</a:t>
+              <a:t>23</a:t>
             </a:fld>
             <a:endParaRPr lang="de-CH" dirty="0"/>
           </a:p>
@@ -7425,278 +7698,6 @@
     <p:extLst>
       <p:ext uri="{BB962C8B-B14F-4D97-AF65-F5344CB8AC3E}">
         <p14:creationId xmlns:p14="http://schemas.microsoft.com/office/powerpoint/2010/main" val="3231399696"/>
-      </p:ext>
-    </p:extLst>
-  </p:cSld>
-  <p:clrMapOvr>
-    <a:masterClrMapping/>
-  </p:clrMapOvr>
-</p:sld>
-</file>
-
-<file path=ppt/slides/slide23.xml><?xml version="1.0" encoding="utf-8"?>
-<p:sld xmlns:a="http://schemas.openxmlformats.org/drawingml/2006/main" xmlns:r="http://schemas.openxmlformats.org/officeDocument/2006/relationships" xmlns:p="http://schemas.openxmlformats.org/presentationml/2006/main">
-  <p:cSld>
-    <p:spTree>
-      <p:nvGrpSpPr>
-        <p:cNvPr id="1" name=""/>
-        <p:cNvGrpSpPr/>
-        <p:nvPr/>
-      </p:nvGrpSpPr>
-      <p:grpSpPr>
-        <a:xfrm>
-          <a:off x="0" y="0"/>
-          <a:ext cx="0" cy="0"/>
-          <a:chOff x="0" y="0"/>
-          <a:chExt cx="0" cy="0"/>
-        </a:xfrm>
-      </p:grpSpPr>
-      <p:sp>
-        <p:nvSpPr>
-          <p:cNvPr id="2" name="Titel 1"/>
-          <p:cNvSpPr>
-            <a:spLocks noGrp="1"/>
-          </p:cNvSpPr>
-          <p:nvPr>
-            <p:ph type="title"/>
-          </p:nvPr>
-        </p:nvSpPr>
-        <p:spPr/>
-        <p:txBody>
-          <a:bodyPr/>
-          <a:lstStyle/>
-          <a:p>
-            <a:br>
-              <a:rPr lang="de-CH" sz="3600" dirty="0"/>
-            </a:br>
-            <a:r>
-              <a:rPr lang="de-CH" sz="3600" dirty="0"/>
-              <a:t>Zuständigkeiten</a:t>
-            </a:r>
-          </a:p>
-        </p:txBody>
-      </p:sp>
-      <p:sp>
-        <p:nvSpPr>
-          <p:cNvPr id="3" name="Inhaltsplatzhalter 2"/>
-          <p:cNvSpPr>
-            <a:spLocks noGrp="1"/>
-          </p:cNvSpPr>
-          <p:nvPr>
-            <p:ph idx="1"/>
-          </p:nvPr>
-        </p:nvSpPr>
-        <p:spPr/>
-        <p:txBody>
-          <a:bodyPr/>
-          <a:lstStyle/>
-          <a:p>
-            <a:pPr>
-              <a:lnSpc>
-                <a:spcPct val="100000"/>
-              </a:lnSpc>
-            </a:pPr>
-            <a:r>
-              <a:rPr lang="de-CH" sz="2400" dirty="0"/>
-              <a:t>-Matthias:</a:t>
-            </a:r>
-          </a:p>
-          <a:p>
-            <a:pPr>
-              <a:lnSpc>
-                <a:spcPct val="100000"/>
-              </a:lnSpc>
-            </a:pPr>
-            <a:r>
-              <a:rPr lang="de-CH" sz="2400" dirty="0"/>
-              <a:t>	Engine, Game Logik, QA</a:t>
-            </a:r>
-          </a:p>
-          <a:p>
-            <a:pPr>
-              <a:lnSpc>
-                <a:spcPct val="100000"/>
-              </a:lnSpc>
-            </a:pPr>
-            <a:r>
-              <a:rPr lang="de-CH" sz="2400" dirty="0"/>
-              <a:t>-Moritz:</a:t>
-            </a:r>
-          </a:p>
-          <a:p>
-            <a:pPr>
-              <a:lnSpc>
-                <a:spcPct val="100000"/>
-              </a:lnSpc>
-            </a:pPr>
-            <a:r>
-              <a:rPr lang="de-CH" sz="2400" dirty="0"/>
-              <a:t>	Client, Grafik</a:t>
-            </a:r>
-          </a:p>
-          <a:p>
-            <a:pPr>
-              <a:lnSpc>
-                <a:spcPct val="100000"/>
-              </a:lnSpc>
-            </a:pPr>
-            <a:r>
-              <a:rPr lang="de-CH" sz="2400" dirty="0"/>
-              <a:t>-Sanja:</a:t>
-            </a:r>
-          </a:p>
-          <a:p>
-            <a:pPr>
-              <a:lnSpc>
-                <a:spcPct val="100000"/>
-              </a:lnSpc>
-            </a:pPr>
-            <a:r>
-              <a:rPr lang="de-CH" sz="2400" dirty="0"/>
-              <a:t>	Server, QA</a:t>
-            </a:r>
-          </a:p>
-          <a:p>
-            <a:pPr>
-              <a:lnSpc>
-                <a:spcPct val="100000"/>
-              </a:lnSpc>
-            </a:pPr>
-            <a:r>
-              <a:rPr lang="de-CH" sz="2400" dirty="0"/>
-              <a:t>-Sebastian:</a:t>
-            </a:r>
-          </a:p>
-          <a:p>
-            <a:pPr>
-              <a:lnSpc>
-                <a:spcPct val="100000"/>
-              </a:lnSpc>
-            </a:pPr>
-            <a:r>
-              <a:rPr lang="de-CH" sz="2400" dirty="0"/>
-              <a:t>	Grafik, Game Logik</a:t>
-            </a:r>
-          </a:p>
-          <a:p>
-            <a:pPr>
-              <a:lnSpc>
-                <a:spcPct val="100000"/>
-              </a:lnSpc>
-            </a:pPr>
-            <a:r>
-              <a:rPr lang="de-CH" sz="2400" dirty="0"/>
-              <a:t>-Viktor:</a:t>
-            </a:r>
-          </a:p>
-          <a:p>
-            <a:pPr>
-              <a:lnSpc>
-                <a:spcPct val="100000"/>
-              </a:lnSpc>
-            </a:pPr>
-            <a:r>
-              <a:rPr lang="de-CH" sz="2400" dirty="0"/>
-              <a:t>	Client/Server Kommunikation, Server</a:t>
-            </a:r>
-          </a:p>
-        </p:txBody>
-      </p:sp>
-      <p:sp>
-        <p:nvSpPr>
-          <p:cNvPr id="4" name="Datumsplatzhalter 3"/>
-          <p:cNvSpPr>
-            <a:spLocks noGrp="1"/>
-          </p:cNvSpPr>
-          <p:nvPr>
-            <p:ph type="dt" sz="half" idx="10"/>
-          </p:nvPr>
-        </p:nvSpPr>
-        <p:spPr>
-          <a:xfrm>
-            <a:off x="431800" y="6524626"/>
-            <a:ext cx="3204096" cy="180000"/>
-          </a:xfrm>
-        </p:spPr>
-        <p:txBody>
-          <a:bodyPr/>
-          <a:lstStyle/>
-          <a:p>
-            <a:r>
-              <a:rPr lang="de-CH" dirty="0"/>
-              <a:t>Meilenstein 1, </a:t>
-            </a:r>
-            <a:r>
-              <a:rPr lang="de-CH" dirty="0" err="1"/>
-              <a:t>Joe’s</a:t>
-            </a:r>
-            <a:r>
-              <a:rPr lang="de-CH" dirty="0"/>
-              <a:t> </a:t>
-            </a:r>
-            <a:r>
-              <a:rPr lang="de-CH" dirty="0" err="1"/>
-              <a:t>Buddler</a:t>
-            </a:r>
-            <a:r>
-              <a:rPr lang="de-CH" dirty="0"/>
-              <a:t> Corp., Feb 2019  </a:t>
-            </a:r>
-          </a:p>
-        </p:txBody>
-      </p:sp>
-      <p:sp>
-        <p:nvSpPr>
-          <p:cNvPr id="5" name="Fußzeilenplatzhalter 4"/>
-          <p:cNvSpPr>
-            <a:spLocks noGrp="1"/>
-          </p:cNvSpPr>
-          <p:nvPr>
-            <p:ph type="ftr" sz="quarter" idx="11"/>
-          </p:nvPr>
-        </p:nvSpPr>
-        <p:spPr/>
-        <p:txBody>
-          <a:bodyPr/>
-          <a:lstStyle/>
-          <a:p>
-            <a:pPr algn="r"/>
-            <a:r>
-              <a:rPr lang="de-CH"/>
-              <a:t>Universität Basel</a:t>
-            </a:r>
-            <a:endParaRPr lang="de-CH" dirty="0"/>
-          </a:p>
-        </p:txBody>
-      </p:sp>
-      <p:sp>
-        <p:nvSpPr>
-          <p:cNvPr id="6" name="Foliennummernplatzhalter 5"/>
-          <p:cNvSpPr>
-            <a:spLocks noGrp="1"/>
-          </p:cNvSpPr>
-          <p:nvPr>
-            <p:ph type="sldNum" sz="quarter" idx="12"/>
-          </p:nvPr>
-        </p:nvSpPr>
-        <p:spPr/>
-        <p:txBody>
-          <a:bodyPr/>
-          <a:lstStyle/>
-          <a:p>
-            <a:fld id="{B3811826-9277-4232-A2B5-17D05DFC7392}" type="slidenum">
-              <a:rPr lang="de-CH" smtClean="0"/>
-              <a:pPr/>
-              <a:t>23</a:t>
-            </a:fld>
-            <a:endParaRPr lang="de-CH" dirty="0"/>
-          </a:p>
-        </p:txBody>
-      </p:sp>
-    </p:spTree>
-    <p:extLst>
-      <p:ext uri="{BB962C8B-B14F-4D97-AF65-F5344CB8AC3E}">
-        <p14:creationId xmlns:p14="http://schemas.microsoft.com/office/powerpoint/2010/main" val="2859989666"/>
       </p:ext>
     </p:extLst>
   </p:cSld>

</xml_diff>

<commit_message>
Client & Server Folie
</commit_message>
<xml_diff>
--- a/Presentations/Milestone 1/Präsentation_Buddler_Joe.pptx
+++ b/Presentations/Milestone 1/Präsentation_Buddler_Joe.pptx
@@ -392,7 +392,7 @@
           <a:p>
             <a:fld id="{484FEB8E-57CB-43C0-BEF7-4F4116A5252C}" type="datetimeFigureOut">
               <a:rPr lang="de-CH" smtClean="0"/>
-              <a:t>05.03.19</a:t>
+              <a:t>05.03.2019</a:t>
             </a:fld>
             <a:endParaRPr lang="de-CH"/>
           </a:p>
@@ -6271,7 +6271,83 @@
           <a:p>
             <a:r>
               <a:rPr lang="de-CH" sz="2400" dirty="0"/>
-              <a:t>TODO:</a:t>
+              <a:t>Ausgangslage:</a:t>
+            </a:r>
+          </a:p>
+          <a:p>
+            <a:pPr lvl="1"/>
+            <a:endParaRPr lang="de-CH" sz="2400" dirty="0"/>
+          </a:p>
+          <a:p>
+            <a:pPr lvl="1"/>
+            <a:r>
+              <a:rPr lang="de-CH" sz="2400" dirty="0"/>
+              <a:t>Echtzeitspiel mit ca. 60 Frames pro Sekunde</a:t>
+            </a:r>
+          </a:p>
+          <a:p>
+            <a:pPr lvl="1"/>
+            <a:endParaRPr lang="de-CH" sz="2400" dirty="0"/>
+          </a:p>
+          <a:p>
+            <a:pPr lvl="1"/>
+            <a:r>
+              <a:rPr lang="de-CH" sz="2400" dirty="0"/>
+              <a:t>Jedes Frame mehrere Positions-Updates</a:t>
+            </a:r>
+          </a:p>
+          <a:p>
+            <a:pPr lvl="1"/>
+            <a:endParaRPr lang="de-CH" sz="2400" dirty="0"/>
+          </a:p>
+          <a:p>
+            <a:pPr lvl="1"/>
+            <a:r>
+              <a:rPr lang="de-CH" sz="2400" dirty="0"/>
+              <a:t>Hunderte Pakete pro Sekunde</a:t>
+            </a:r>
+          </a:p>
+          <a:p>
+            <a:pPr lvl="1"/>
+            <a:endParaRPr lang="de-CH" sz="2400" dirty="0"/>
+          </a:p>
+          <a:p>
+            <a:pPr lvl="1"/>
+            <a:r>
+              <a:rPr lang="de-CH" sz="2400" dirty="0"/>
+              <a:t>Geschwindigkeit ist wichtiger als Verlässlichkeit</a:t>
+            </a:r>
+          </a:p>
+          <a:p>
+            <a:pPr lvl="1"/>
+            <a:endParaRPr lang="de-CH" sz="2400" dirty="0"/>
+          </a:p>
+          <a:p>
+            <a:pPr marL="2286000" lvl="5" indent="0">
+              <a:buNone/>
+            </a:pPr>
+            <a:endParaRPr lang="de-CH" sz="2400" dirty="0"/>
+          </a:p>
+          <a:p>
+            <a:pPr marL="2286000" lvl="5" indent="0">
+              <a:buNone/>
+            </a:pPr>
+            <a:endParaRPr lang="de-CH" sz="2600" dirty="0"/>
+          </a:p>
+          <a:p>
+            <a:pPr marL="0" lvl="1" indent="0">
+              <a:buNone/>
+            </a:pPr>
+            <a:endParaRPr lang="de-CH" sz="2400" dirty="0"/>
+          </a:p>
+          <a:p>
+            <a:pPr lvl="1">
+              <a:buFont typeface="Symbol" panose="05050102010706020507" pitchFamily="18" charset="2"/>
+              <a:buChar char="-"/>
+            </a:pPr>
+            <a:r>
+              <a:rPr lang="de-CH" sz="2400" dirty="0"/>
+              <a:t>Wichtige Pakete müssen bestätigt werden</a:t>
             </a:r>
           </a:p>
         </p:txBody>
@@ -6364,6 +6440,95 @@
               <a:t>18</a:t>
             </a:fld>
             <a:endParaRPr lang="de-CH" dirty="0"/>
+          </a:p>
+        </p:txBody>
+      </p:sp>
+      <p:sp>
+        <p:nvSpPr>
+          <p:cNvPr id="9" name="Arrow: Right 8">
+            <a:extLst>
+              <a:ext uri="{FF2B5EF4-FFF2-40B4-BE49-F238E27FC236}">
+                <a16:creationId xmlns:a16="http://schemas.microsoft.com/office/drawing/2014/main" id="{1D81D513-DE20-4B6A-B555-25F561912E6D}"/>
+              </a:ext>
+            </a:extLst>
+          </p:cNvPr>
+          <p:cNvSpPr/>
+          <p:nvPr/>
+        </p:nvSpPr>
+        <p:spPr>
+          <a:xfrm>
+            <a:off x="611560" y="4561605"/>
+            <a:ext cx="971848" cy="481383"/>
+          </a:xfrm>
+          <a:prstGeom prst="rightArrow">
+            <a:avLst/>
+          </a:prstGeom>
+          <a:ln>
+            <a:noFill/>
+          </a:ln>
+        </p:spPr>
+        <p:style>
+          <a:lnRef idx="2">
+            <a:schemeClr val="accent1">
+              <a:shade val="50000"/>
+            </a:schemeClr>
+          </a:lnRef>
+          <a:fillRef idx="1">
+            <a:schemeClr val="accent1"/>
+          </a:fillRef>
+          <a:effectRef idx="0">
+            <a:schemeClr val="accent1"/>
+          </a:effectRef>
+          <a:fontRef idx="minor">
+            <a:schemeClr val="lt1"/>
+          </a:fontRef>
+        </p:style>
+        <p:txBody>
+          <a:bodyPr rtlCol="0" anchor="ctr"/>
+          <a:lstStyle/>
+          <a:p>
+            <a:pPr algn="ctr"/>
+            <a:endParaRPr lang="de-CH" dirty="0" err="1"/>
+          </a:p>
+        </p:txBody>
+      </p:sp>
+      <p:sp>
+        <p:nvSpPr>
+          <p:cNvPr id="10" name="TextBox 9">
+            <a:extLst>
+              <a:ext uri="{FF2B5EF4-FFF2-40B4-BE49-F238E27FC236}">
+                <a16:creationId xmlns:a16="http://schemas.microsoft.com/office/drawing/2014/main" id="{BA9D48E7-786C-47A1-8C76-011E5A418137}"/>
+              </a:ext>
+            </a:extLst>
+          </p:cNvPr>
+          <p:cNvSpPr txBox="1"/>
+          <p:nvPr/>
+        </p:nvSpPr>
+        <p:spPr>
+          <a:xfrm>
+            <a:off x="1820193" y="4703543"/>
+            <a:ext cx="2736304" cy="381642"/>
+          </a:xfrm>
+          <a:prstGeom prst="rect">
+            <a:avLst/>
+          </a:prstGeom>
+          <a:noFill/>
+        </p:spPr>
+        <p:txBody>
+          <a:bodyPr wrap="square" lIns="0" tIns="0" rIns="0" bIns="0" rtlCol="0">
+            <a:noAutofit/>
+          </a:bodyPr>
+          <a:lstStyle/>
+          <a:p>
+            <a:pPr>
+              <a:lnSpc>
+                <a:spcPts val="2200"/>
+              </a:lnSpc>
+            </a:pPr>
+            <a:r>
+              <a:rPr lang="de-CH" sz="3000" b="1" dirty="0"/>
+              <a:t>UDP Protokoll</a:t>
+            </a:r>
           </a:p>
         </p:txBody>
       </p:sp>
@@ -6795,10 +6960,9 @@
               <a:buAutoNum type="arabicPeriod"/>
             </a:pPr>
             <a:r>
-              <a:rPr lang="de-CH" sz="2400"/>
+              <a:rPr lang="de-CH" sz="2400" dirty="0"/>
               <a:t>Timeline</a:t>
             </a:r>
-            <a:endParaRPr lang="de-CH" sz="2400" dirty="0"/>
           </a:p>
           <a:p>
             <a:pPr marL="457200" indent="-457200">

</xml_diff>

<commit_message>
made some changes to my Slide
</commit_message>
<xml_diff>
--- a/Presentations/Milestone 1/Präsentation_Buddler_Joe.pptx
+++ b/Presentations/Milestone 1/Präsentation_Buddler_Joe.pptx
@@ -392,7 +392,7 @@
           <a:p>
             <a:fld id="{484FEB8E-57CB-43C0-BEF7-4F4116A5252C}" type="datetimeFigureOut">
               <a:rPr lang="de-CH" smtClean="0"/>
-              <a:t>05.03.2019</a:t>
+              <a:t>06.03.2019</a:t>
             </a:fld>
             <a:endParaRPr lang="de-CH"/>
           </a:p>
@@ -551,7 +551,7 @@
           <a:p>
             <a:fld id="{DA53D58F-CC03-47C4-AC79-D3C984A61519}" type="slidenum">
               <a:rPr lang="de-CH" smtClean="0"/>
-              <a:t>‹#›</a:t>
+              <a:t>‹Nr.›</a:t>
             </a:fld>
             <a:endParaRPr lang="de-CH"/>
           </a:p>
@@ -1004,7 +1004,7 @@
             <a:fld id="{B3811826-9277-4232-A2B5-17D05DFC7392}" type="slidenum">
               <a:rPr lang="de-CH" smtClean="0"/>
               <a:pPr/>
-              <a:t>‹#›</a:t>
+              <a:t>‹Nr.›</a:t>
             </a:fld>
             <a:endParaRPr lang="de-CH" dirty="0"/>
           </a:p>
@@ -1501,7 +1501,7 @@
             <a:fld id="{B3811826-9277-4232-A2B5-17D05DFC7392}" type="slidenum">
               <a:rPr lang="de-CH" smtClean="0"/>
               <a:pPr/>
-              <a:t>‹#›</a:t>
+              <a:t>‹Nr.›</a:t>
             </a:fld>
             <a:endParaRPr lang="de-CH" dirty="0"/>
           </a:p>
@@ -1625,7 +1625,7 @@
             <a:fld id="{B3811826-9277-4232-A2B5-17D05DFC7392}" type="slidenum">
               <a:rPr lang="de-CH" smtClean="0"/>
               <a:pPr/>
-              <a:t>‹#›</a:t>
+              <a:t>‹Nr.›</a:t>
             </a:fld>
             <a:endParaRPr lang="de-CH" dirty="0"/>
           </a:p>
@@ -1850,7 +1850,7 @@
             <a:fld id="{B3811826-9277-4232-A2B5-17D05DFC7392}" type="slidenum">
               <a:rPr lang="de-CH" smtClean="0"/>
               <a:pPr/>
-              <a:t>‹#›</a:t>
+              <a:t>‹Nr.›</a:t>
             </a:fld>
             <a:endParaRPr lang="de-CH" dirty="0"/>
           </a:p>
@@ -2176,7 +2176,7 @@
             <a:fld id="{B3811826-9277-4232-A2B5-17D05DFC7392}" type="slidenum">
               <a:rPr lang="de-CH" smtClean="0"/>
               <a:pPr/>
-              <a:t>‹#›</a:t>
+              <a:t>‹Nr.›</a:t>
             </a:fld>
             <a:endParaRPr lang="de-CH" dirty="0"/>
           </a:p>
@@ -2580,7 +2580,7 @@
             <a:fld id="{B3811826-9277-4232-A2B5-17D05DFC7392}" type="slidenum">
               <a:rPr lang="de-CH" smtClean="0"/>
               <a:pPr/>
-              <a:t>‹#›</a:t>
+              <a:t>‹Nr.›</a:t>
             </a:fld>
             <a:endParaRPr lang="de-CH" dirty="0"/>
           </a:p>
@@ -2863,7 +2863,7 @@
             <a:fld id="{B3811826-9277-4232-A2B5-17D05DFC7392}" type="slidenum">
               <a:rPr lang="de-CH" smtClean="0"/>
               <a:pPr/>
-              <a:t>‹#›</a:t>
+              <a:t>‹Nr.›</a:t>
             </a:fld>
             <a:endParaRPr lang="de-CH" dirty="0"/>
           </a:p>
@@ -3108,7 +3108,7 @@
             <a:fld id="{B3811826-9277-4232-A2B5-17D05DFC7392}" type="slidenum">
               <a:rPr lang="de-CH" smtClean="0"/>
               <a:pPr/>
-              <a:t>‹#›</a:t>
+              <a:t>‹Nr.›</a:t>
             </a:fld>
             <a:endParaRPr lang="de-CH" dirty="0"/>
           </a:p>
@@ -6059,7 +6059,7 @@
             <a:pPr lvl="1"/>
             <a:r>
               <a:rPr lang="de-CH" sz="2400" dirty="0"/>
-              <a:t>Spielwelt</a:t>
+              <a:t>Animation</a:t>
             </a:r>
           </a:p>
           <a:p>
@@ -6070,7 +6070,7 @@
             <a:pPr lvl="1"/>
             <a:r>
               <a:rPr lang="de-CH" sz="2400" dirty="0"/>
-              <a:t>Position und Kollisionserkennung</a:t>
+              <a:t>Spielwelt</a:t>
             </a:r>
           </a:p>
           <a:p>
@@ -6081,7 +6081,7 @@
             <a:pPr lvl="1"/>
             <a:r>
               <a:rPr lang="de-CH" sz="2400" dirty="0"/>
-              <a:t>Schwerkraft</a:t>
+              <a:t>Position und Kollisionserkennung</a:t>
             </a:r>
           </a:p>
           <a:p>
@@ -6092,7 +6092,7 @@
             <a:pPr lvl="1"/>
             <a:r>
               <a:rPr lang="de-CH" sz="2400" dirty="0"/>
-              <a:t>Animation</a:t>
+              <a:t>Schwerkraft</a:t>
             </a:r>
           </a:p>
           <a:p>

</xml_diff>